<commit_message>
small modifs of the presentation
</commit_message>
<xml_diff>
--- a/presentation.pptx
+++ b/presentation.pptx
@@ -5,7 +5,7 @@
     <p:sldMasterId id="2147483648" r:id="rId1"/>
   </p:sldMasterIdLst>
   <p:notesMasterIdLst>
-    <p:notesMasterId r:id="rId20"/>
+    <p:notesMasterId r:id="rId21"/>
   </p:notesMasterIdLst>
   <p:sldIdLst>
     <p:sldId id="256" r:id="rId2"/>
@@ -23,9 +23,10 @@
     <p:sldId id="270" r:id="rId14"/>
     <p:sldId id="271" r:id="rId15"/>
     <p:sldId id="272" r:id="rId16"/>
-    <p:sldId id="273" r:id="rId17"/>
-    <p:sldId id="274" r:id="rId18"/>
+    <p:sldId id="274" r:id="rId17"/>
+    <p:sldId id="273" r:id="rId18"/>
     <p:sldId id="275" r:id="rId19"/>
+    <p:sldId id="276" r:id="rId20"/>
   </p:sldIdLst>
   <p:sldSz cx="12192000" cy="6858000"/>
   <p:notesSz cx="6858000" cy="9144000"/>
@@ -136,6 +137,8 @@
 <p1510:revInfo xmlns:a="http://schemas.openxmlformats.org/drawingml/2006/main" xmlns:r="http://schemas.openxmlformats.org/officeDocument/2006/relationships" xmlns:p1510="http://schemas.microsoft.com/office/powerpoint/2015/10/main">
   <p1510:revLst>
     <p1510:client id="{0B3FFD1B-0838-4DEC-998B-430D1443A8CE}" v="7" dt="2022-12-22T21:45:51.025"/>
+    <p1510:client id="{44A108B5-D022-4D8F-A96D-7D1922A4E3B6}" v="68" dt="2022-12-23T14:28:35.239"/>
+    <p1510:client id="{5494A5E1-1565-48DD-961F-5B2AA561558B}" v="20" dt="2022-12-23T14:36:50.402"/>
     <p1510:client id="{A5FF3627-0DBC-467A-BE4F-19DFD0E5A32F}" v="2845" dt="2022-12-23T09:11:31.759"/>
     <p1510:client id="{D016B5E3-1441-4BFD-96BE-4756E2A38045}" v="78" dt="2022-12-22T17:14:22.102"/>
   </p1510:revLst>
@@ -144,6 +147,153 @@
 
 <file path=ppt/changesInfos/changesInfo1.xml><?xml version="1.0" encoding="utf-8"?>
 <pc:chgInfo xmlns:a="http://schemas.openxmlformats.org/drawingml/2006/main" xmlns:r="http://schemas.openxmlformats.org/officeDocument/2006/relationships" xmlns:ac="http://schemas.microsoft.com/office/drawing/2013/main/command" xmlns:pc="http://schemas.microsoft.com/office/powerpoint/2013/main/command">
+  <pc:docChgLst>
+    <pc:chgData name="Pasquier Benjamin" userId="64eef630-2480-4bc0-af7e-1bca8748de8f" providerId="ADAL" clId="{5494A5E1-1565-48DD-961F-5B2AA561558B}"/>
+    <pc:docChg chg="modSld">
+      <pc:chgData name="Pasquier Benjamin" userId="64eef630-2480-4bc0-af7e-1bca8748de8f" providerId="ADAL" clId="{5494A5E1-1565-48DD-961F-5B2AA561558B}" dt="2022-12-23T14:36:50.402" v="19" actId="20577"/>
+      <pc:docMkLst>
+        <pc:docMk/>
+      </pc:docMkLst>
+      <pc:sldChg chg="modNotesTx">
+        <pc:chgData name="Pasquier Benjamin" userId="64eef630-2480-4bc0-af7e-1bca8748de8f" providerId="ADAL" clId="{5494A5E1-1565-48DD-961F-5B2AA561558B}" dt="2022-12-23T14:36:50.402" v="19" actId="20577"/>
+        <pc:sldMkLst>
+          <pc:docMk/>
+          <pc:sldMk cId="4087177126" sldId="264"/>
+        </pc:sldMkLst>
+      </pc:sldChg>
+      <pc:sldChg chg="addSp modSp">
+        <pc:chgData name="Pasquier Benjamin" userId="64eef630-2480-4bc0-af7e-1bca8748de8f" providerId="ADAL" clId="{5494A5E1-1565-48DD-961F-5B2AA561558B}" dt="2022-12-23T14:30:41.535" v="17" actId="1076"/>
+        <pc:sldMkLst>
+          <pc:docMk/>
+          <pc:sldMk cId="3701858593" sldId="276"/>
+        </pc:sldMkLst>
+        <pc:grpChg chg="add mod">
+          <ac:chgData name="Pasquier Benjamin" userId="64eef630-2480-4bc0-af7e-1bca8748de8f" providerId="ADAL" clId="{5494A5E1-1565-48DD-961F-5B2AA561558B}" dt="2022-12-23T14:30:41.535" v="17" actId="1076"/>
+          <ac:grpSpMkLst>
+            <pc:docMk/>
+            <pc:sldMk cId="3701858593" sldId="276"/>
+            <ac:grpSpMk id="3" creationId="{EB620A33-B478-F856-D35B-FF421AA134B5}"/>
+          </ac:grpSpMkLst>
+        </pc:grpChg>
+        <pc:picChg chg="add mod">
+          <ac:chgData name="Pasquier Benjamin" userId="64eef630-2480-4bc0-af7e-1bca8748de8f" providerId="ADAL" clId="{5494A5E1-1565-48DD-961F-5B2AA561558B}" dt="2022-12-23T14:30:41.535" v="17" actId="1076"/>
+          <ac:picMkLst>
+            <pc:docMk/>
+            <pc:sldMk cId="3701858593" sldId="276"/>
+            <ac:picMk id="1026" creationId="{222419F1-9E45-186D-2F89-BD8A8BC94375}"/>
+          </ac:picMkLst>
+        </pc:picChg>
+        <pc:picChg chg="add mod">
+          <ac:chgData name="Pasquier Benjamin" userId="64eef630-2480-4bc0-af7e-1bca8748de8f" providerId="ADAL" clId="{5494A5E1-1565-48DD-961F-5B2AA561558B}" dt="2022-12-23T14:30:41.535" v="17" actId="1076"/>
+          <ac:picMkLst>
+            <pc:docMk/>
+            <pc:sldMk cId="3701858593" sldId="276"/>
+            <ac:picMk id="1028" creationId="{0FBDEC46-D595-A597-D19F-AC459E7F4F3C}"/>
+          </ac:picMkLst>
+        </pc:picChg>
+      </pc:sldChg>
+    </pc:docChg>
+  </pc:docChgLst>
+  <pc:docChgLst>
+    <pc:chgData name="Pasquier Benjamin" userId="S::benjamin.pasquier1@hes-so.ch::64eef630-2480-4bc0-af7e-1bca8748de8f" providerId="AD" clId="Web-{44A108B5-D022-4D8F-A96D-7D1922A4E3B6}"/>
+    <pc:docChg chg="addSld modSld">
+      <pc:chgData name="Pasquier Benjamin" userId="S::benjamin.pasquier1@hes-so.ch::64eef630-2480-4bc0-af7e-1bca8748de8f" providerId="AD" clId="Web-{44A108B5-D022-4D8F-A96D-7D1922A4E3B6}" dt="2022-12-23T14:28:35.239" v="141"/>
+      <pc:docMkLst>
+        <pc:docMk/>
+      </pc:docMkLst>
+      <pc:sldChg chg="modSp modNotes">
+        <pc:chgData name="Pasquier Benjamin" userId="S::benjamin.pasquier1@hes-so.ch::64eef630-2480-4bc0-af7e-1bca8748de8f" providerId="AD" clId="Web-{44A108B5-D022-4D8F-A96D-7D1922A4E3B6}" dt="2022-12-23T14:24:54.032" v="91"/>
+        <pc:sldMkLst>
+          <pc:docMk/>
+          <pc:sldMk cId="2361432571" sldId="257"/>
+        </pc:sldMkLst>
+        <pc:spChg chg="mod">
+          <ac:chgData name="Pasquier Benjamin" userId="S::benjamin.pasquier1@hes-so.ch::64eef630-2480-4bc0-af7e-1bca8748de8f" providerId="AD" clId="Web-{44A108B5-D022-4D8F-A96D-7D1922A4E3B6}" dt="2022-12-23T14:05:30.857" v="6" actId="20577"/>
+          <ac:spMkLst>
+            <pc:docMk/>
+            <pc:sldMk cId="2361432571" sldId="257"/>
+            <ac:spMk id="5" creationId="{425A1C46-9F62-85C7-C871-3C29B12BE39E}"/>
+          </ac:spMkLst>
+        </pc:spChg>
+        <pc:spChg chg="mod">
+          <ac:chgData name="Pasquier Benjamin" userId="S::benjamin.pasquier1@hes-so.ch::64eef630-2480-4bc0-af7e-1bca8748de8f" providerId="AD" clId="Web-{44A108B5-D022-4D8F-A96D-7D1922A4E3B6}" dt="2022-12-23T14:19:58.168" v="87" actId="20577"/>
+          <ac:spMkLst>
+            <pc:docMk/>
+            <pc:sldMk cId="2361432571" sldId="257"/>
+            <ac:spMk id="30" creationId="{F3247BA3-5902-27E0-C8BD-6B027F5A5AFA}"/>
+          </ac:spMkLst>
+        </pc:spChg>
+      </pc:sldChg>
+      <pc:sldChg chg="modNotes">
+        <pc:chgData name="Pasquier Benjamin" userId="S::benjamin.pasquier1@hes-so.ch::64eef630-2480-4bc0-af7e-1bca8748de8f" providerId="AD" clId="Web-{44A108B5-D022-4D8F-A96D-7D1922A4E3B6}" dt="2022-12-23T14:11:04.800" v="78"/>
+        <pc:sldMkLst>
+          <pc:docMk/>
+          <pc:sldMk cId="2531192339" sldId="258"/>
+        </pc:sldMkLst>
+      </pc:sldChg>
+      <pc:sldChg chg="modNotes">
+        <pc:chgData name="Pasquier Benjamin" userId="S::benjamin.pasquier1@hes-so.ch::64eef630-2480-4bc0-af7e-1bca8748de8f" providerId="AD" clId="Web-{44A108B5-D022-4D8F-A96D-7D1922A4E3B6}" dt="2022-12-23T14:12:43.192" v="82"/>
+        <pc:sldMkLst>
+          <pc:docMk/>
+          <pc:sldMk cId="1712160368" sldId="260"/>
+        </pc:sldMkLst>
+      </pc:sldChg>
+      <pc:sldChg chg="modNotes">
+        <pc:chgData name="Pasquier Benjamin" userId="S::benjamin.pasquier1@hes-so.ch::64eef630-2480-4bc0-af7e-1bca8748de8f" providerId="AD" clId="Web-{44A108B5-D022-4D8F-A96D-7D1922A4E3B6}" dt="2022-12-23T14:17:02.306" v="84"/>
+        <pc:sldMkLst>
+          <pc:docMk/>
+          <pc:sldMk cId="1204267370" sldId="262"/>
+        </pc:sldMkLst>
+      </pc:sldChg>
+      <pc:sldChg chg="addSp delSp modSp add replId">
+        <pc:chgData name="Pasquier Benjamin" userId="S::benjamin.pasquier1@hes-so.ch::64eef630-2480-4bc0-af7e-1bca8748de8f" providerId="AD" clId="Web-{44A108B5-D022-4D8F-A96D-7D1922A4E3B6}" dt="2022-12-23T14:28:35.239" v="141"/>
+        <pc:sldMkLst>
+          <pc:docMk/>
+          <pc:sldMk cId="3701858593" sldId="276"/>
+        </pc:sldMkLst>
+        <pc:spChg chg="del">
+          <ac:chgData name="Pasquier Benjamin" userId="S::benjamin.pasquier1@hes-so.ch::64eef630-2480-4bc0-af7e-1bca8748de8f" providerId="AD" clId="Web-{44A108B5-D022-4D8F-A96D-7D1922A4E3B6}" dt="2022-12-23T14:25:09.908" v="94"/>
+          <ac:spMkLst>
+            <pc:docMk/>
+            <pc:sldMk cId="3701858593" sldId="276"/>
+            <ac:spMk id="3" creationId="{A9CAA3FF-D24A-B906-0BDE-7B0DCFCB7E1C}"/>
+          </ac:spMkLst>
+        </pc:spChg>
+        <pc:spChg chg="mod">
+          <ac:chgData name="Pasquier Benjamin" userId="S::benjamin.pasquier1@hes-so.ch::64eef630-2480-4bc0-af7e-1bca8748de8f" providerId="AD" clId="Web-{44A108B5-D022-4D8F-A96D-7D1922A4E3B6}" dt="2022-12-23T14:26:27.659" v="129" actId="20577"/>
+          <ac:spMkLst>
+            <pc:docMk/>
+            <pc:sldMk cId="3701858593" sldId="276"/>
+            <ac:spMk id="11" creationId="{123CE6CF-D91B-D2E4-4DD4-CBF0694CCA01}"/>
+          </ac:spMkLst>
+        </pc:spChg>
+        <pc:picChg chg="add del mod">
+          <ac:chgData name="Pasquier Benjamin" userId="S::benjamin.pasquier1@hes-so.ch::64eef630-2480-4bc0-af7e-1bca8748de8f" providerId="AD" clId="Web-{44A108B5-D022-4D8F-A96D-7D1922A4E3B6}" dt="2022-12-23T14:28:13.895" v="135"/>
+          <ac:picMkLst>
+            <pc:docMk/>
+            <pc:sldMk cId="3701858593" sldId="276"/>
+            <ac:picMk id="4" creationId="{CD99D3DB-E04C-E106-F68E-7E155C0DA291}"/>
+          </ac:picMkLst>
+        </pc:picChg>
+        <pc:picChg chg="add del mod">
+          <ac:chgData name="Pasquier Benjamin" userId="S::benjamin.pasquier1@hes-so.ch::64eef630-2480-4bc0-af7e-1bca8748de8f" providerId="AD" clId="Web-{44A108B5-D022-4D8F-A96D-7D1922A4E3B6}" dt="2022-12-23T14:28:35.239" v="141"/>
+          <ac:picMkLst>
+            <pc:docMk/>
+            <pc:sldMk cId="3701858593" sldId="276"/>
+            <ac:picMk id="5" creationId="{E8BF2519-A18E-EB55-C4F1-AE90E99D89FF}"/>
+          </ac:picMkLst>
+        </pc:picChg>
+        <pc:picChg chg="del">
+          <ac:chgData name="Pasquier Benjamin" userId="S::benjamin.pasquier1@hes-so.ch::64eef630-2480-4bc0-af7e-1bca8748de8f" providerId="AD" clId="Web-{44A108B5-D022-4D8F-A96D-7D1922A4E3B6}" dt="2022-12-23T14:25:06.642" v="93"/>
+          <ac:picMkLst>
+            <pc:docMk/>
+            <pc:sldMk cId="3701858593" sldId="276"/>
+            <ac:picMk id="18434" creationId="{B420BCA7-4DCB-B9A8-81BD-46ED9AAF465C}"/>
+          </ac:picMkLst>
+        </pc:picChg>
+      </pc:sldChg>
+    </pc:docChg>
+  </pc:docChgLst>
   <pc:docChgLst>
     <pc:chgData name="Pasquier Benjamin" userId="64eef630-2480-4bc0-af7e-1bca8748de8f" providerId="ADAL" clId="{A5FF3627-0DBC-467A-BE4F-19DFD0E5A32F}"/>
     <pc:docChg chg="undo custSel modSld">
@@ -366,6 +516,29 @@
     </pc:docChg>
   </pc:docChgLst>
   <pc:docChgLst>
+    <pc:chgData name="Benjamin Pasquier" userId="64eef630-2480-4bc0-af7e-1bca8748de8f" providerId="ADAL" clId="{11D1933E-1511-F145-B2DB-BA0B7AB01916}"/>
+    <pc:docChg chg="custSel modSld">
+      <pc:chgData name="Benjamin Pasquier" userId="64eef630-2480-4bc0-af7e-1bca8748de8f" providerId="ADAL" clId="{11D1933E-1511-F145-B2DB-BA0B7AB01916}" dt="2022-12-23T09:48:37.017" v="2204" actId="20577"/>
+      <pc:docMkLst>
+        <pc:docMk/>
+      </pc:docMkLst>
+      <pc:sldChg chg="modNotesTx">
+        <pc:chgData name="Benjamin Pasquier" userId="64eef630-2480-4bc0-af7e-1bca8748de8f" providerId="ADAL" clId="{11D1933E-1511-F145-B2DB-BA0B7AB01916}" dt="2022-12-23T09:39:43.834" v="785" actId="20577"/>
+        <pc:sldMkLst>
+          <pc:docMk/>
+          <pc:sldMk cId="565019388" sldId="263"/>
+        </pc:sldMkLst>
+      </pc:sldChg>
+      <pc:sldChg chg="modNotesTx">
+        <pc:chgData name="Benjamin Pasquier" userId="64eef630-2480-4bc0-af7e-1bca8748de8f" providerId="ADAL" clId="{11D1933E-1511-F145-B2DB-BA0B7AB01916}" dt="2022-12-23T09:48:37.017" v="2204" actId="20577"/>
+        <pc:sldMkLst>
+          <pc:docMk/>
+          <pc:sldMk cId="4087177126" sldId="264"/>
+        </pc:sldMkLst>
+      </pc:sldChg>
+    </pc:docChg>
+  </pc:docChgLst>
+  <pc:docChgLst>
     <pc:chgData name="Pasquier Benjamin" userId="S::benjamin.pasquier1@hes-so.ch::64eef630-2480-4bc0-af7e-1bca8748de8f" providerId="AD" clId="Web-{0B3FFD1B-0838-4DEC-998B-430D1443A8CE}"/>
     <pc:docChg chg="modSld">
       <pc:chgData name="Pasquier Benjamin" userId="S::benjamin.pasquier1@hes-so.ch::64eef630-2480-4bc0-af7e-1bca8748de8f" providerId="AD" clId="Web-{0B3FFD1B-0838-4DEC-998B-430D1443A8CE}" dt="2022-12-22T21:45:51.025" v="5" actId="1076"/>
@@ -409,29 +582,6 @@
             <ac:picMk id="4" creationId="{0B1CBF5F-25A0-E93F-5E9D-8D59E8624E59}"/>
           </ac:picMkLst>
         </pc:picChg>
-      </pc:sldChg>
-    </pc:docChg>
-  </pc:docChgLst>
-  <pc:docChgLst>
-    <pc:chgData name="Benjamin Pasquier" userId="64eef630-2480-4bc0-af7e-1bca8748de8f" providerId="ADAL" clId="{11D1933E-1511-F145-B2DB-BA0B7AB01916}"/>
-    <pc:docChg chg="custSel modSld">
-      <pc:chgData name="Benjamin Pasquier" userId="64eef630-2480-4bc0-af7e-1bca8748de8f" providerId="ADAL" clId="{11D1933E-1511-F145-B2DB-BA0B7AB01916}" dt="2022-12-23T09:48:37.017" v="2204" actId="20577"/>
-      <pc:docMkLst>
-        <pc:docMk/>
-      </pc:docMkLst>
-      <pc:sldChg chg="modNotesTx">
-        <pc:chgData name="Benjamin Pasquier" userId="64eef630-2480-4bc0-af7e-1bca8748de8f" providerId="ADAL" clId="{11D1933E-1511-F145-B2DB-BA0B7AB01916}" dt="2022-12-23T09:39:43.834" v="785" actId="20577"/>
-        <pc:sldMkLst>
-          <pc:docMk/>
-          <pc:sldMk cId="565019388" sldId="263"/>
-        </pc:sldMkLst>
-      </pc:sldChg>
-      <pc:sldChg chg="modNotesTx">
-        <pc:chgData name="Benjamin Pasquier" userId="64eef630-2480-4bc0-af7e-1bca8748de8f" providerId="ADAL" clId="{11D1933E-1511-F145-B2DB-BA0B7AB01916}" dt="2022-12-23T09:48:37.017" v="2204" actId="20577"/>
-        <pc:sldMkLst>
-          <pc:docMk/>
-          <pc:sldMk cId="4087177126" sldId="264"/>
-        </pc:sldMkLst>
       </pc:sldChg>
     </pc:docChg>
   </pc:docChgLst>
@@ -1957,7 +2107,7 @@
           <a:p>
             <a:fld id="{6A8497C1-B552-48B9-B79A-D5FAA7AE07D7}" type="slidenum">
               <a:rPr lang="fr-CH" smtClean="0"/>
-              <a:t>‹N°›</a:t>
+              <a:t>‹#›</a:t>
             </a:fld>
             <a:endParaRPr lang="fr-CH"/>
           </a:p>
@@ -2327,6 +2477,93 @@
 </p:notes>
 </file>
 
+<file path=ppt/notesSlides/notesSlide12.xml><?xml version="1.0" encoding="utf-8"?>
+<p:notes xmlns:a="http://schemas.openxmlformats.org/drawingml/2006/main" xmlns:r="http://schemas.openxmlformats.org/officeDocument/2006/relationships" xmlns:p="http://schemas.openxmlformats.org/presentationml/2006/main">
+  <p:cSld>
+    <p:spTree>
+      <p:nvGrpSpPr>
+        <p:cNvPr id="1" name=""/>
+        <p:cNvGrpSpPr/>
+        <p:nvPr/>
+      </p:nvGrpSpPr>
+      <p:grpSpPr>
+        <a:xfrm>
+          <a:off x="0" y="0"/>
+          <a:ext cx="0" cy="0"/>
+          <a:chOff x="0" y="0"/>
+          <a:chExt cx="0" cy="0"/>
+        </a:xfrm>
+      </p:grpSpPr>
+      <p:sp>
+        <p:nvSpPr>
+          <p:cNvPr id="2" name="Espace réservé de l'image des diapositives 1"/>
+          <p:cNvSpPr>
+            <a:spLocks noGrp="1" noRot="1" noChangeAspect="1"/>
+          </p:cNvSpPr>
+          <p:nvPr>
+            <p:ph type="sldImg"/>
+          </p:nvPr>
+        </p:nvSpPr>
+        <p:spPr/>
+      </p:sp>
+      <p:sp>
+        <p:nvSpPr>
+          <p:cNvPr id="3" name="Espace réservé des notes 2"/>
+          <p:cNvSpPr>
+            <a:spLocks noGrp="1"/>
+          </p:cNvSpPr>
+          <p:nvPr>
+            <p:ph type="body" idx="1"/>
+          </p:nvPr>
+        </p:nvSpPr>
+        <p:spPr/>
+        <p:txBody>
+          <a:bodyPr/>
+          <a:lstStyle/>
+          <a:p>
+            <a:r>
+              <a:rPr lang="fr-CH"/>
+              <a:t>-&gt; Laurent</a:t>
+            </a:r>
+          </a:p>
+        </p:txBody>
+      </p:sp>
+      <p:sp>
+        <p:nvSpPr>
+          <p:cNvPr id="4" name="Espace réservé du numéro de diapositive 3"/>
+          <p:cNvSpPr>
+            <a:spLocks noGrp="1"/>
+          </p:cNvSpPr>
+          <p:nvPr>
+            <p:ph type="sldNum" sz="quarter" idx="5"/>
+          </p:nvPr>
+        </p:nvSpPr>
+        <p:spPr/>
+        <p:txBody>
+          <a:bodyPr/>
+          <a:lstStyle/>
+          <a:p>
+            <a:fld id="{6A8497C1-B552-48B9-B79A-D5FAA7AE07D7}" type="slidenum">
+              <a:rPr lang="fr-CH" smtClean="0"/>
+              <a:t>19</a:t>
+            </a:fld>
+            <a:endParaRPr lang="fr-CH"/>
+          </a:p>
+        </p:txBody>
+      </p:sp>
+    </p:spTree>
+    <p:extLst>
+      <p:ext uri="{BB962C8B-B14F-4D97-AF65-F5344CB8AC3E}">
+        <p14:creationId xmlns:p14="http://schemas.microsoft.com/office/powerpoint/2010/main" val="72292232"/>
+      </p:ext>
+    </p:extLst>
+  </p:cSld>
+  <p:clrMapOvr>
+    <a:masterClrMapping/>
+  </p:clrMapOvr>
+</p:notes>
+</file>
+
 <file path=ppt/notesSlides/notesSlide2.xml><?xml version="1.0" encoding="utf-8"?>
 <p:notes xmlns:a="http://schemas.openxmlformats.org/drawingml/2006/main" xmlns:r="http://schemas.openxmlformats.org/officeDocument/2006/relationships" xmlns:p="http://schemas.openxmlformats.org/presentationml/2006/main">
   <p:cSld>
@@ -2373,7 +2610,7 @@
           <a:p>
             <a:r>
               <a:rPr lang="fr-CH"/>
-              <a:t>Durant cette présentation on va d’abord pour expliquer notre intention et le public ciblé par notre application, on va ensuite vous parler des données que nous avons choisies d’utiliser, ensuite nous vous présenterons les différentes représentations que nous réalisés, on vous parlera de la présentation de l’application et des interactions qu’elle contient, on continuera avec une démonstration et finalement une petite </a:t>
+              <a:t>Durant cette présentation on va d’abord expliquer notre intention et le public ciblé par notre application, on va ensuite vous parler des données que nous avons choisies d’utiliser, ensuite nous vous présenterons les différentes représentations que nous avons réalisés, on vous parlera de la présentation de l'interface et des interactions qu’elle contient, on continuera avec une </a:t>
             </a:r>
             <a:r>
               <a:rPr lang="fr-CH" err="1"/>
@@ -2381,7 +2618,7 @@
             </a:r>
             <a:r>
               <a:rPr lang="fr-CH"/>
-              <a:t> et critique des outils utilisées.</a:t>
+              <a:t> et critique des outils utilisées et on finira par la démonstration finale.</a:t>
             </a:r>
           </a:p>
         </p:txBody>
@@ -2468,7 +2705,7 @@
           <a:p>
             <a:r>
               <a:rPr lang="fr-CH" sz="1400"/>
-              <a:t>La NBA est la ligue américaine de basketball, c’est la plus prestigieuse du monde et depuis 1946, elle a évolué dans de nombreux aspects. </a:t>
+              <a:t>On a décidé de focaliser sur la NBA, en particulier les données de joueurs de cette ligue. La NBA est la ligue américaine de basketball, c’est la plus prestigieuse du monde et depuis 1946, elle a évolué dans de nombreux aspects. </a:t>
             </a:r>
           </a:p>
           <a:p>
@@ -2485,8 +2722,22 @@
             </a:r>
             <a:r>
               <a:rPr lang="fr-CH" sz="1400"/>
-              <a:t> une des compétences les plus recherchés par les entraîneurs. </a:t>
-            </a:r>
+              <a:t> une des compétences les plus recherchés par les entraîneurs. </a:t>
+            </a:r>
+          </a:p>
+          <a:p>
+            <a:endParaRPr lang="fr-CH" sz="1400">
+              <a:cs typeface="Calibri" panose="020F0502020204030204"/>
+            </a:endParaRPr>
+          </a:p>
+          <a:p>
+            <a:r>
+              <a:rPr lang="fr-CH" sz="1400"/>
+              <a:t>Les salaires ont également augmenté, il est difficile de savoir si un joueur méritent un salaire aussi grand. </a:t>
+            </a:r>
+            <a:endParaRPr lang="fr-CH" sz="1400">
+              <a:cs typeface="Calibri"/>
+            </a:endParaRPr>
           </a:p>
           <a:p>
             <a:endParaRPr lang="fr-CH" sz="1400"/>
@@ -2494,17 +2745,11 @@
           <a:p>
             <a:r>
               <a:rPr lang="fr-CH" sz="1400"/>
-              <a:t>Les salaires ont également augmenté, il est difficile de savoir si un joueur méritent un salaire aussi grand. </a:t>
-            </a:r>
-          </a:p>
-          <a:p>
-            <a:endParaRPr lang="fr-CH" sz="1400"/>
-          </a:p>
-          <a:p>
-            <a:r>
-              <a:rPr lang="fr-CH" sz="1400"/>
-              <a:t>En parallèle, les attentes des entraîneurs et des directeurs sportifs ont aussi évolué et ce projet donc cible ce public là, et vise a pour but de leur permette de visualiser les caractéristiques de joueurs selon différents angles, afin d’envisager des chats, des ventes ou des transferts pour améliorer leur équipe. </a:t>
-            </a:r>
+              <a:t>En parallèle, les attentes des entraîneurs et des directeurs sportifs ont aussi évolué et ce projet donc cible ce public là, et a pour but de leur permette de visualiser les caractéristiques de joueurs selon différents angles, afin d’envisager des achats, des ventes ou des transferts pour améliorer leur équipe. </a:t>
+            </a:r>
+            <a:endParaRPr lang="fr-CH" sz="1400">
+              <a:cs typeface="Calibri"/>
+            </a:endParaRPr>
           </a:p>
           <a:p>
             <a:endParaRPr lang="fr-CH" sz="1400"/>
@@ -2514,6 +2759,9 @@
               <a:rPr lang="fr-CH" sz="1400"/>
               <a:t>L’objectif est donc de créer un outil d’analyse et de comparaison selon principalement des statistiques.</a:t>
             </a:r>
+            <a:endParaRPr lang="fr-CH" sz="1400">
+              <a:cs typeface="Calibri"/>
+            </a:endParaRPr>
           </a:p>
         </p:txBody>
       </p:sp>
@@ -2616,8 +2864,11 @@
             </a:r>
             <a:r>
               <a:rPr lang="fr-CH"/>
-              <a:t>, il permet de faire la liaison entre le site et python</a:t>
-            </a:r>
+              <a:t>, qui permet de faire la liaison entre le site et python</a:t>
+            </a:r>
+            <a:endParaRPr lang="fr-CH">
+              <a:cs typeface="Calibri"/>
+            </a:endParaRPr>
           </a:p>
           <a:p>
             <a:endParaRPr lang="fr-CH"/>
@@ -2635,6 +2886,9 @@
               <a:rPr lang="fr-CH"/>
               <a:t>, mais on a préféré de pas perdre trop de temps sur cette étape.</a:t>
             </a:r>
+            <a:endParaRPr lang="fr-CH">
+              <a:cs typeface="Calibri"/>
+            </a:endParaRPr>
           </a:p>
         </p:txBody>
       </p:sp>
@@ -2726,8 +2980,11 @@
           <a:p>
             <a:r>
               <a:rPr lang="fr-CH"/>
-              <a:t>Typiquement, certain requête donnait des infos par saison, d’autres par match uniquement. Il fallait donc utiliser une autre requête pour faire le lien entre le match et la saison.</a:t>
-            </a:r>
+              <a:t>Typiquement, certaine requête donnait des infos par saison, d’autres par match uniquement. Il fallait donc utiliser une autre requête pour faire le lien entre le match et la saison.</a:t>
+            </a:r>
+            <a:endParaRPr lang="fr-CH">
+              <a:cs typeface="Calibri"/>
+            </a:endParaRPr>
           </a:p>
           <a:p>
             <a:endParaRPr lang="fr-CH"/>
@@ -2737,6 +2994,9 @@
               <a:rPr lang="fr-CH"/>
               <a:t>La récupération des données a pris aussi un peu de temps, on a du mettre des timeout pour pas être bloqué, et des fois bien sûr recommencé car on avait pas récupéré les bonnes données. Pour gagner du temps, on a pris uniquement 128 joueurs, qu’on a choisi selon les stats les plus importantes.</a:t>
             </a:r>
+            <a:endParaRPr lang="fr-CH">
+              <a:cs typeface="Calibri"/>
+            </a:endParaRPr>
           </a:p>
           <a:p>
             <a:endParaRPr lang="fr-CH"/>
@@ -2744,8 +3004,11 @@
           <a:p>
             <a:r>
               <a:rPr lang="fr-CH"/>
-              <a:t>Une fois qu’on a récupéré les données et qu’on les as traité, on a constitué une base de données statiques, justement pour pas dépendre de l’API et aussi pour avoir des données propres, dans le bon format. On a des JSON pour les infos et les stats, et des CSV pour la localisation des tirs. Vous avez ici des exemples. On a aouté une info, qui est le score, et qui est calculé selon les statistiques de la dernière saison, ça sert à  donner l’état de forme actuelle du joueur.</a:t>
-            </a:r>
+              <a:t>Une fois qu’on a récupéré les données et qu’on les as traité, on a constitué une base de données statiques, justement pour pas dépendre de l’API et aussi pour avoir des données propres, dans le bon format. On a des JSON pour les infos et les stats, et des CSV pour la localisation des tirs. Vous avez ici des exemples. On a aouté une info, qui est le score, et qui est calculé selon les statistiques de la dernière saison, ça sert à  donner l’état de forme actuelle du joueur.</a:t>
+            </a:r>
+            <a:endParaRPr lang="fr-CH">
+              <a:cs typeface="Calibri"/>
+            </a:endParaRPr>
           </a:p>
           <a:p>
             <a:endParaRPr lang="fr-CH"/>
@@ -2763,6 +3026,9 @@
               <a:rPr lang="fr-CH"/>
               <a:t>) et les données, qui contient des méthodes qui retournent les données nécessaire aux représentations de l’interface. Elles ont été définis en amont, comme ça on a pu paralléliser le travail aussi.</a:t>
             </a:r>
+            <a:endParaRPr lang="fr-CH">
+              <a:cs typeface="Calibri"/>
+            </a:endParaRPr>
           </a:p>
           <a:p>
             <a:endParaRPr lang="fr-CH"/>
@@ -2853,7 +3119,7 @@
           <a:lstStyle/>
           <a:p>
             <a:r>
-              <a:rPr lang="fr-CH" dirty="0"/>
+              <a:rPr lang="fr-CH"/>
               <a:t>La première représentation est assez simple, il s’agit d’un tableau qui contient les informations et les statistiques des joueurs durant la saison actuelle. Elle offre donc une vue globale et actuelle des données, et permet de rapidement trouver un joueur qui correspond à un certain critère de recherches (est ce qu’on se focalise sur les points, sur le salaire, sur les perfs globales). C’est la vue la plus globale des données, et les content quasiment toutes.</a:t>
             </a:r>
           </a:p>
@@ -2940,66 +3206,53 @@
           <a:lstStyle/>
           <a:p>
             <a:r>
-              <a:rPr lang="fr-CH" dirty="0"/>
-              <a:t>Ensuite on a une représentation sous forme de carte comparatives. Une carte est construire un peu comme une carte de visite, ou une carte à collectionner (dans les jeux vidéos de foot ou de basket typiquement).</a:t>
-            </a:r>
-          </a:p>
-          <a:p>
-            <a:r>
-              <a:rPr lang="fr-CH" dirty="0"/>
+              <a:rPr lang="fr-CH"/>
+              <a:t>Ensuite on a une représentation sous forme de carte comparatives. Une carte est construite un peu comme une carte de visite, ou une carte à collectionner (dans les jeux vidéos de foot ou de basket typiquement).</a:t>
+            </a:r>
+          </a:p>
+          <a:p>
+            <a:r>
+              <a:rPr lang="fr-CH"/>
               <a:t>Chaque carte contient les infos du joueur, avec en plus sa photo (ça c’est surtout visuel) ainsi que les statistiques du joueur selon une certaine période que l’utilisateur choisie. La représentation est composé de deux cartes, mises l’une à côté de l’autre, qui permet aussi de comparer les deux joueurs entre eux.</a:t>
             </a:r>
           </a:p>
           <a:p>
-            <a:endParaRPr lang="fr-CH" dirty="0"/>
-          </a:p>
-          <a:p>
-            <a:r>
-              <a:rPr lang="fr-CH" dirty="0"/>
+            <a:endParaRPr lang="fr-CH"/>
+          </a:p>
+          <a:p>
+            <a:r>
+              <a:rPr lang="fr-CH"/>
               <a:t>Cette représentation permet </a:t>
             </a:r>
             <a:r>
-              <a:rPr lang="fr-CH" dirty="0" err="1"/>
+              <a:rPr lang="fr-CH" err="1"/>
               <a:t>danalyser</a:t>
             </a:r>
             <a:r>
-              <a:rPr lang="fr-CH" dirty="0"/>
-              <a:t> les </a:t>
-            </a:r>
-            <a:r>
-              <a:rPr lang="fr-CH" dirty="0" err="1"/>
-              <a:t>stats</a:t>
-            </a:r>
-            <a:r>
-              <a:rPr lang="fr-CH" dirty="0"/>
-              <a:t> du joueur en fonction d’une certaine période, de manière textuelle, elle </a:t>
-            </a:r>
-            <a:r>
-              <a:rPr lang="fr-CH" dirty="0" err="1"/>
+              <a:rPr lang="fr-CH"/>
+              <a:t> les stats du joueur en fonction d’une certaine période, de manière textuelle, elle </a:t>
+            </a:r>
+            <a:r>
+              <a:rPr lang="fr-CH" err="1"/>
               <a:t>complétemnte</a:t>
             </a:r>
             <a:r>
-              <a:rPr lang="fr-CH" dirty="0"/>
+              <a:rPr lang="fr-CH"/>
               <a:t> donc le tableau (focalisation sur un joueur et aspect du temps) mais également de comparer deux joueurs entre eux (typiquement des joueurs avec le même profil)</a:t>
             </a:r>
           </a:p>
           <a:p>
-            <a:endParaRPr lang="fr-CH" dirty="0"/>
-          </a:p>
-          <a:p>
-            <a:r>
-              <a:rPr lang="fr-CH" dirty="0" err="1"/>
+            <a:endParaRPr lang="fr-CH"/>
+          </a:p>
+          <a:p>
+            <a:r>
+              <a:rPr lang="fr-CH" err="1"/>
               <a:t>Cest</a:t>
             </a:r>
             <a:r>
-              <a:rPr lang="fr-CH" dirty="0"/>
-              <a:t> la première des représentations comparatives entre deux joueurs, Nathan va maintenant vous présenter </a:t>
-            </a:r>
-            <a:r>
               <a:rPr lang="fr-CH"/>
-              <a:t>les autres.</a:t>
-            </a:r>
-            <a:endParaRPr lang="fr-CH" dirty="0"/>
+              <a:t> la première des représentations comparatives entre deux joueurs, Nathan va maintenant vous présenter les autres.</a:t>
+            </a:r>
           </a:p>
         </p:txBody>
       </p:sp>
@@ -3416,7 +3669,7 @@
           <a:p>
             <a:fld id="{DE2EC9D6-2C76-4CFC-9CBB-8494071DBCD3}" type="slidenum">
               <a:rPr lang="fr-CH" smtClean="0"/>
-              <a:t>‹N°›</a:t>
+              <a:t>‹#›</a:t>
             </a:fld>
             <a:endParaRPr lang="fr-CH"/>
           </a:p>
@@ -3616,7 +3869,7 @@
           <a:p>
             <a:fld id="{DE2EC9D6-2C76-4CFC-9CBB-8494071DBCD3}" type="slidenum">
               <a:rPr lang="fr-CH" smtClean="0"/>
-              <a:t>‹N°›</a:t>
+              <a:t>‹#›</a:t>
             </a:fld>
             <a:endParaRPr lang="fr-CH"/>
           </a:p>
@@ -3826,7 +4079,7 @@
           <a:p>
             <a:fld id="{DE2EC9D6-2C76-4CFC-9CBB-8494071DBCD3}" type="slidenum">
               <a:rPr lang="fr-CH" smtClean="0"/>
-              <a:t>‹N°›</a:t>
+              <a:t>‹#›</a:t>
             </a:fld>
             <a:endParaRPr lang="fr-CH"/>
           </a:p>
@@ -4026,7 +4279,7 @@
           <a:p>
             <a:fld id="{DE2EC9D6-2C76-4CFC-9CBB-8494071DBCD3}" type="slidenum">
               <a:rPr lang="fr-CH" smtClean="0"/>
-              <a:t>‹N°›</a:t>
+              <a:t>‹#›</a:t>
             </a:fld>
             <a:endParaRPr lang="fr-CH"/>
           </a:p>
@@ -4302,7 +4555,7 @@
           <a:p>
             <a:fld id="{DE2EC9D6-2C76-4CFC-9CBB-8494071DBCD3}" type="slidenum">
               <a:rPr lang="fr-CH" smtClean="0"/>
-              <a:t>‹N°›</a:t>
+              <a:t>‹#›</a:t>
             </a:fld>
             <a:endParaRPr lang="fr-CH"/>
           </a:p>
@@ -4570,7 +4823,7 @@
           <a:p>
             <a:fld id="{DE2EC9D6-2C76-4CFC-9CBB-8494071DBCD3}" type="slidenum">
               <a:rPr lang="fr-CH" smtClean="0"/>
-              <a:t>‹N°›</a:t>
+              <a:t>‹#›</a:t>
             </a:fld>
             <a:endParaRPr lang="fr-CH"/>
           </a:p>
@@ -4985,7 +5238,7 @@
           <a:p>
             <a:fld id="{DE2EC9D6-2C76-4CFC-9CBB-8494071DBCD3}" type="slidenum">
               <a:rPr lang="fr-CH" smtClean="0"/>
-              <a:t>‹N°›</a:t>
+              <a:t>‹#›</a:t>
             </a:fld>
             <a:endParaRPr lang="fr-CH"/>
           </a:p>
@@ -5127,7 +5380,7 @@
           <a:p>
             <a:fld id="{DE2EC9D6-2C76-4CFC-9CBB-8494071DBCD3}" type="slidenum">
               <a:rPr lang="fr-CH" smtClean="0"/>
-              <a:t>‹N°›</a:t>
+              <a:t>‹#›</a:t>
             </a:fld>
             <a:endParaRPr lang="fr-CH"/>
           </a:p>
@@ -5240,7 +5493,7 @@
           <a:p>
             <a:fld id="{DE2EC9D6-2C76-4CFC-9CBB-8494071DBCD3}" type="slidenum">
               <a:rPr lang="fr-CH" smtClean="0"/>
-              <a:t>‹N°›</a:t>
+              <a:t>‹#›</a:t>
             </a:fld>
             <a:endParaRPr lang="fr-CH"/>
           </a:p>
@@ -5553,7 +5806,7 @@
           <a:p>
             <a:fld id="{DE2EC9D6-2C76-4CFC-9CBB-8494071DBCD3}" type="slidenum">
               <a:rPr lang="fr-CH" smtClean="0"/>
-              <a:t>‹N°›</a:t>
+              <a:t>‹#›</a:t>
             </a:fld>
             <a:endParaRPr lang="fr-CH"/>
           </a:p>
@@ -5842,7 +6095,7 @@
           <a:p>
             <a:fld id="{DE2EC9D6-2C76-4CFC-9CBB-8494071DBCD3}" type="slidenum">
               <a:rPr lang="fr-CH" smtClean="0"/>
-              <a:t>‹N°›</a:t>
+              <a:t>‹#›</a:t>
             </a:fld>
             <a:endParaRPr lang="fr-CH"/>
           </a:p>
@@ -6121,7 +6374,7 @@
           <a:p>
             <a:fld id="{DE2EC9D6-2C76-4CFC-9CBB-8494071DBCD3}" type="slidenum">
               <a:rPr lang="fr-CH" smtClean="0"/>
-              <a:t>‹N°›</a:t>
+              <a:t>‹#›</a:t>
             </a:fld>
             <a:endParaRPr lang="fr-CH"/>
           </a:p>
@@ -11149,6 +11402,536 @@
           <a:chExt cx="0" cy="0"/>
         </a:xfrm>
       </p:grpSpPr>
+      <p:sp>
+        <p:nvSpPr>
+          <p:cNvPr id="11" name="Titre 1">
+            <a:extLst>
+              <a:ext uri="{FF2B5EF4-FFF2-40B4-BE49-F238E27FC236}">
+                <a16:creationId xmlns:a16="http://schemas.microsoft.com/office/drawing/2014/main" id="{123CE6CF-D91B-D2E4-4DD4-CBF0694CCA01}"/>
+              </a:ext>
+            </a:extLst>
+          </p:cNvPr>
+          <p:cNvSpPr>
+            <a:spLocks noGrp="1"/>
+          </p:cNvSpPr>
+          <p:nvPr>
+            <p:ph type="title"/>
+          </p:nvPr>
+        </p:nvSpPr>
+        <p:spPr>
+          <a:xfrm>
+            <a:off x="838343" y="520616"/>
+            <a:ext cx="7822578" cy="750108"/>
+          </a:xfrm>
+        </p:spPr>
+        <p:txBody>
+          <a:bodyPr anchor="t">
+            <a:normAutofit/>
+          </a:bodyPr>
+          <a:lstStyle/>
+          <a:p>
+            <a:r>
+              <a:rPr lang="fr-CH">
+                <a:latin typeface="Aharoni" panose="02010803020104030203" pitchFamily="2" charset="-79"/>
+                <a:cs typeface="Aharoni" panose="02010803020104030203" pitchFamily="2" charset="-79"/>
+              </a:rPr>
+              <a:t>Outils utilisés</a:t>
+            </a:r>
+          </a:p>
+        </p:txBody>
+      </p:sp>
+      <p:sp>
+        <p:nvSpPr>
+          <p:cNvPr id="8" name="Titre 1">
+            <a:extLst>
+              <a:ext uri="{FF2B5EF4-FFF2-40B4-BE49-F238E27FC236}">
+                <a16:creationId xmlns:a16="http://schemas.microsoft.com/office/drawing/2014/main" id="{893DBA4A-638D-088C-A287-B6746B285636}"/>
+              </a:ext>
+            </a:extLst>
+          </p:cNvPr>
+          <p:cNvSpPr txBox="1">
+            <a:spLocks/>
+          </p:cNvSpPr>
+          <p:nvPr/>
+        </p:nvSpPr>
+        <p:spPr>
+          <a:xfrm>
+            <a:off x="838200" y="2065078"/>
+            <a:ext cx="5467709" cy="4016545"/>
+          </a:xfrm>
+          <a:prstGeom prst="rect">
+            <a:avLst/>
+          </a:prstGeom>
+        </p:spPr>
+        <p:txBody>
+          <a:bodyPr vert="horz" lIns="91440" tIns="45720" rIns="91440" bIns="45720" rtlCol="0" anchor="t">
+            <a:normAutofit fontScale="97500"/>
+          </a:bodyPr>
+          <a:lstStyle>
+            <a:lvl1pPr algn="l" defTabSz="914400" rtl="0" eaLnBrk="1" latinLnBrk="0" hangingPunct="1">
+              <a:lnSpc>
+                <a:spcPct val="90000"/>
+              </a:lnSpc>
+              <a:spcBef>
+                <a:spcPct val="0"/>
+              </a:spcBef>
+              <a:buNone/>
+              <a:defRPr sz="4400" kern="1200">
+                <a:solidFill>
+                  <a:schemeClr val="tx1"/>
+                </a:solidFill>
+                <a:latin typeface="+mj-lt"/>
+                <a:ea typeface="+mj-ea"/>
+                <a:cs typeface="+mj-cs"/>
+              </a:defRPr>
+            </a:lvl1pPr>
+          </a:lstStyle>
+          <a:p>
+            <a:pPr marL="285750" indent="-285750">
+              <a:spcBef>
+                <a:spcPts val="1000"/>
+              </a:spcBef>
+              <a:buFont typeface="Arial" panose="020B0604020202020204" pitchFamily="34" charset="0"/>
+              <a:buChar char="•"/>
+            </a:pPr>
+            <a:endParaRPr lang="fr-CH" sz="300">
+              <a:solidFill>
+                <a:srgbClr val="000000"/>
+              </a:solidFill>
+              <a:latin typeface="Bahnschrift" panose="020B0502040204020203" pitchFamily="34" charset="0"/>
+              <a:ea typeface="+mn-ea"/>
+              <a:cs typeface="+mn-cs"/>
+            </a:endParaRPr>
+          </a:p>
+          <a:p>
+            <a:pPr marL="285750" indent="-285750">
+              <a:spcBef>
+                <a:spcPts val="1000"/>
+              </a:spcBef>
+              <a:buFont typeface="Arial" panose="020B0604020202020204" pitchFamily="34" charset="0"/>
+              <a:buChar char="•"/>
+            </a:pPr>
+            <a:endParaRPr lang="fr-CH" sz="2900" kern="1200">
+              <a:solidFill>
+                <a:srgbClr val="000000"/>
+              </a:solidFill>
+              <a:effectLst/>
+              <a:latin typeface="Bahnschrift" panose="020B0502040204020203" pitchFamily="34" charset="0"/>
+              <a:ea typeface="+mn-ea"/>
+              <a:cs typeface="+mn-cs"/>
+            </a:endParaRPr>
+          </a:p>
+        </p:txBody>
+      </p:sp>
+      <p:sp>
+        <p:nvSpPr>
+          <p:cNvPr id="5" name="ZoneTexte 4">
+            <a:extLst>
+              <a:ext uri="{FF2B5EF4-FFF2-40B4-BE49-F238E27FC236}">
+                <a16:creationId xmlns:a16="http://schemas.microsoft.com/office/drawing/2014/main" id="{865DD11E-FFC6-F310-93EA-264AA40E601E}"/>
+              </a:ext>
+            </a:extLst>
+          </p:cNvPr>
+          <p:cNvSpPr txBox="1"/>
+          <p:nvPr/>
+        </p:nvSpPr>
+        <p:spPr>
+          <a:xfrm>
+            <a:off x="6883880" y="6581001"/>
+            <a:ext cx="5308122" cy="276999"/>
+          </a:xfrm>
+          <a:prstGeom prst="rect">
+            <a:avLst/>
+          </a:prstGeom>
+          <a:noFill/>
+        </p:spPr>
+        <p:txBody>
+          <a:bodyPr wrap="square" rtlCol="0">
+            <a:spAutoFit/>
+          </a:bodyPr>
+          <a:lstStyle/>
+          <a:p>
+            <a:pPr algn="r"/>
+            <a:r>
+              <a:rPr lang="fr-CH" sz="1200"/>
+              <a:t>https://plotly.com/dash/</a:t>
+            </a:r>
+          </a:p>
+        </p:txBody>
+      </p:sp>
+      <p:sp>
+        <p:nvSpPr>
+          <p:cNvPr id="3" name="Titre 1">
+            <a:extLst>
+              <a:ext uri="{FF2B5EF4-FFF2-40B4-BE49-F238E27FC236}">
+                <a16:creationId xmlns:a16="http://schemas.microsoft.com/office/drawing/2014/main" id="{A9CAA3FF-D24A-B906-0BDE-7B0DCFCB7E1C}"/>
+              </a:ext>
+            </a:extLst>
+          </p:cNvPr>
+          <p:cNvSpPr txBox="1">
+            <a:spLocks/>
+          </p:cNvSpPr>
+          <p:nvPr/>
+        </p:nvSpPr>
+        <p:spPr>
+          <a:xfrm>
+            <a:off x="838200" y="2065078"/>
+            <a:ext cx="9556630" cy="4272306"/>
+          </a:xfrm>
+          <a:prstGeom prst="rect">
+            <a:avLst/>
+          </a:prstGeom>
+        </p:spPr>
+        <p:txBody>
+          <a:bodyPr vert="horz" lIns="91440" tIns="45720" rIns="91440" bIns="45720" rtlCol="0" anchor="t">
+            <a:normAutofit fontScale="97500"/>
+          </a:bodyPr>
+          <a:lstStyle>
+            <a:lvl1pPr algn="l" defTabSz="914400" rtl="0" eaLnBrk="1" latinLnBrk="0" hangingPunct="1">
+              <a:lnSpc>
+                <a:spcPct val="90000"/>
+              </a:lnSpc>
+              <a:spcBef>
+                <a:spcPct val="0"/>
+              </a:spcBef>
+              <a:buNone/>
+              <a:defRPr sz="4400" kern="1200">
+                <a:solidFill>
+                  <a:schemeClr val="tx1"/>
+                </a:solidFill>
+                <a:latin typeface="+mj-lt"/>
+                <a:ea typeface="+mj-ea"/>
+                <a:cs typeface="+mj-cs"/>
+              </a:defRPr>
+            </a:lvl1pPr>
+          </a:lstStyle>
+          <a:p>
+            <a:pPr marL="285750" indent="-285750" algn="l" rtl="0" eaLnBrk="1" latinLnBrk="0" hangingPunct="1">
+              <a:lnSpc>
+                <a:spcPct val="90000"/>
+              </a:lnSpc>
+              <a:spcBef>
+                <a:spcPts val="1000"/>
+              </a:spcBef>
+              <a:spcAft>
+                <a:spcPts val="0"/>
+              </a:spcAft>
+              <a:buFont typeface="Arial" panose="020B0604020202020204" pitchFamily="34" charset="0"/>
+              <a:buChar char="•"/>
+            </a:pPr>
+            <a:r>
+              <a:rPr lang="fr-CH" sz="2900" kern="1200">
+                <a:solidFill>
+                  <a:srgbClr val="000000"/>
+                </a:solidFill>
+                <a:effectLst/>
+                <a:latin typeface="Bahnschrift" panose="020B0502040204020203" pitchFamily="34" charset="0"/>
+                <a:ea typeface="+mn-ea"/>
+                <a:cs typeface="+mn-cs"/>
+              </a:rPr>
+              <a:t>Librairie Python </a:t>
+            </a:r>
+            <a:r>
+              <a:rPr lang="fr-CH" sz="2900" i="1" kern="1200">
+                <a:solidFill>
+                  <a:srgbClr val="000000"/>
+                </a:solidFill>
+                <a:effectLst/>
+                <a:latin typeface="Bahnschrift" panose="020B0502040204020203" pitchFamily="34" charset="0"/>
+                <a:ea typeface="+mn-ea"/>
+                <a:cs typeface="+mn-cs"/>
+              </a:rPr>
+              <a:t>Dash, </a:t>
+            </a:r>
+            <a:r>
+              <a:rPr lang="fr-CH" sz="2900" kern="1200">
+                <a:solidFill>
+                  <a:srgbClr val="000000"/>
+                </a:solidFill>
+                <a:effectLst/>
+                <a:latin typeface="Bahnschrift" panose="020B0502040204020203" pitchFamily="34" charset="0"/>
+                <a:ea typeface="+mn-ea"/>
+                <a:cs typeface="+mn-cs"/>
+              </a:rPr>
+              <a:t>utilisant la librairie Plotly.js</a:t>
+            </a:r>
+          </a:p>
+          <a:p>
+            <a:pPr marL="742950" lvl="1" indent="-285750">
+              <a:lnSpc>
+                <a:spcPct val="90000"/>
+              </a:lnSpc>
+              <a:spcBef>
+                <a:spcPts val="1000"/>
+              </a:spcBef>
+              <a:buFont typeface="Arial" panose="020B0604020202020204" pitchFamily="34" charset="0"/>
+              <a:buChar char="•"/>
+            </a:pPr>
+            <a:r>
+              <a:rPr lang="fr-CH" sz="2000">
+                <a:solidFill>
+                  <a:srgbClr val="000000"/>
+                </a:solidFill>
+                <a:latin typeface="Bahnschrift" panose="020B0502040204020203" pitchFamily="34" charset="0"/>
+              </a:rPr>
+              <a:t>Développement simplifié et accélérée</a:t>
+            </a:r>
+          </a:p>
+          <a:p>
+            <a:pPr marL="742950" lvl="1" indent="-285750">
+              <a:lnSpc>
+                <a:spcPct val="90000"/>
+              </a:lnSpc>
+              <a:spcBef>
+                <a:spcPts val="1000"/>
+              </a:spcBef>
+              <a:buFont typeface="Arial" panose="020B0604020202020204" pitchFamily="34" charset="0"/>
+              <a:buChar char="•"/>
+            </a:pPr>
+            <a:r>
+              <a:rPr lang="fr-CH" sz="2000">
+                <a:solidFill>
+                  <a:srgbClr val="000000"/>
+                </a:solidFill>
+                <a:latin typeface="Bahnschrift" panose="020B0502040204020203" pitchFamily="34" charset="0"/>
+                <a:ea typeface="+mn-ea"/>
+                <a:cs typeface="+mn-cs"/>
+              </a:rPr>
+              <a:t>Assez vite limitée</a:t>
+            </a:r>
+          </a:p>
+          <a:p>
+            <a:pPr marL="742950" lvl="1" indent="-285750">
+              <a:lnSpc>
+                <a:spcPct val="90000"/>
+              </a:lnSpc>
+              <a:spcBef>
+                <a:spcPts val="1000"/>
+              </a:spcBef>
+              <a:buFont typeface="Arial" panose="020B0604020202020204" pitchFamily="34" charset="0"/>
+              <a:buChar char="•"/>
+            </a:pPr>
+            <a:r>
+              <a:rPr lang="fr-CH" sz="2000">
+                <a:solidFill>
+                  <a:srgbClr val="000000"/>
+                </a:solidFill>
+                <a:latin typeface="Bahnschrift" panose="020B0502040204020203" pitchFamily="34" charset="0"/>
+                <a:ea typeface="+mn-ea"/>
+                <a:cs typeface="+mn-cs"/>
+              </a:rPr>
+              <a:t>Code un peu </a:t>
+            </a:r>
+            <a:r>
+              <a:rPr lang="fr-CH" sz="2000" err="1">
+                <a:solidFill>
+                  <a:srgbClr val="000000"/>
+                </a:solidFill>
+                <a:latin typeface="Bahnschrift" panose="020B0502040204020203" pitchFamily="34" charset="0"/>
+                <a:ea typeface="+mn-ea"/>
+                <a:cs typeface="+mn-cs"/>
+              </a:rPr>
+              <a:t>fouilli</a:t>
+            </a:r>
+            <a:endParaRPr lang="fr-CH" sz="2000">
+              <a:solidFill>
+                <a:srgbClr val="000000"/>
+              </a:solidFill>
+              <a:latin typeface="Bahnschrift" panose="020B0502040204020203" pitchFamily="34" charset="0"/>
+              <a:ea typeface="+mn-ea"/>
+              <a:cs typeface="+mn-cs"/>
+            </a:endParaRPr>
+          </a:p>
+          <a:p>
+            <a:pPr marL="742950" lvl="1" indent="-285750">
+              <a:lnSpc>
+                <a:spcPct val="90000"/>
+              </a:lnSpc>
+              <a:spcBef>
+                <a:spcPts val="1000"/>
+              </a:spcBef>
+              <a:buFont typeface="Arial" panose="020B0604020202020204" pitchFamily="34" charset="0"/>
+              <a:buChar char="•"/>
+            </a:pPr>
+            <a:r>
+              <a:rPr lang="fr-CH" sz="2000">
+                <a:solidFill>
+                  <a:srgbClr val="000000"/>
+                </a:solidFill>
+                <a:latin typeface="Bahnschrift" panose="020B0502040204020203" pitchFamily="34" charset="0"/>
+              </a:rPr>
+              <a:t>Technologie nouvelle</a:t>
+            </a:r>
+            <a:endParaRPr lang="fr-CH" sz="2100">
+              <a:solidFill>
+                <a:srgbClr val="000000"/>
+              </a:solidFill>
+              <a:latin typeface="Bahnschrift" panose="020B0502040204020203" pitchFamily="34" charset="0"/>
+              <a:ea typeface="+mn-ea"/>
+              <a:cs typeface="+mn-cs"/>
+            </a:endParaRPr>
+          </a:p>
+          <a:p>
+            <a:pPr algn="l" rtl="0" eaLnBrk="1" latinLnBrk="0" hangingPunct="1">
+              <a:lnSpc>
+                <a:spcPct val="90000"/>
+              </a:lnSpc>
+              <a:spcBef>
+                <a:spcPts val="1000"/>
+              </a:spcBef>
+              <a:spcAft>
+                <a:spcPts val="0"/>
+              </a:spcAft>
+            </a:pPr>
+            <a:endParaRPr lang="fr-CH" sz="2900" kern="1200">
+              <a:solidFill>
+                <a:srgbClr val="000000"/>
+              </a:solidFill>
+              <a:effectLst/>
+              <a:latin typeface="Bahnschrift" panose="020B0502040204020203" pitchFamily="34" charset="0"/>
+              <a:ea typeface="+mn-ea"/>
+              <a:cs typeface="+mn-cs"/>
+            </a:endParaRPr>
+          </a:p>
+          <a:p>
+            <a:pPr marL="285750" indent="-285750" algn="l" rtl="0" eaLnBrk="1" latinLnBrk="0" hangingPunct="1">
+              <a:lnSpc>
+                <a:spcPct val="90000"/>
+              </a:lnSpc>
+              <a:spcBef>
+                <a:spcPts val="1000"/>
+              </a:spcBef>
+              <a:spcAft>
+                <a:spcPts val="0"/>
+              </a:spcAft>
+              <a:buFont typeface="Arial" panose="020B0604020202020204" pitchFamily="34" charset="0"/>
+              <a:buChar char="•"/>
+            </a:pPr>
+            <a:r>
+              <a:rPr lang="fr-CH" sz="2900" kern="1200">
+                <a:solidFill>
+                  <a:srgbClr val="000000"/>
+                </a:solidFill>
+                <a:effectLst/>
+                <a:latin typeface="Bahnschrift" panose="020B0502040204020203" pitchFamily="34" charset="0"/>
+                <a:ea typeface="+mn-ea"/>
+                <a:cs typeface="+mn-cs"/>
+              </a:rPr>
+              <a:t>Python et </a:t>
+            </a:r>
+            <a:r>
+              <a:rPr lang="fr-CH" sz="2900" kern="1200" err="1">
+                <a:solidFill>
+                  <a:srgbClr val="000000"/>
+                </a:solidFill>
+                <a:effectLst/>
+                <a:latin typeface="Bahnschrift" panose="020B0502040204020203" pitchFamily="34" charset="0"/>
+                <a:ea typeface="+mn-ea"/>
+                <a:cs typeface="+mn-cs"/>
+              </a:rPr>
+              <a:t>Jupyter</a:t>
+            </a:r>
+            <a:r>
+              <a:rPr lang="fr-CH" sz="2900">
+                <a:solidFill>
+                  <a:srgbClr val="000000"/>
+                </a:solidFill>
+                <a:latin typeface="Bahnschrift" panose="020B0502040204020203" pitchFamily="34" charset="0"/>
+                <a:ea typeface="+mn-ea"/>
+                <a:cs typeface="+mn-cs"/>
+              </a:rPr>
+              <a:t> Notebook pour le traitement et le création des données</a:t>
+            </a:r>
+            <a:endParaRPr lang="fr-CH" sz="2900" kern="1200">
+              <a:solidFill>
+                <a:srgbClr val="000000"/>
+              </a:solidFill>
+              <a:effectLst/>
+              <a:latin typeface="Bahnschrift" panose="020B0502040204020203" pitchFamily="34" charset="0"/>
+              <a:ea typeface="+mn-ea"/>
+              <a:cs typeface="+mn-cs"/>
+            </a:endParaRPr>
+          </a:p>
+        </p:txBody>
+      </p:sp>
+      <p:pic>
+        <p:nvPicPr>
+          <p:cNvPr id="17412" name="Picture 4" descr="RAPIDS + Plotly Dash | RAPIDS">
+            <a:extLst>
+              <a:ext uri="{FF2B5EF4-FFF2-40B4-BE49-F238E27FC236}">
+                <a16:creationId xmlns:a16="http://schemas.microsoft.com/office/drawing/2014/main" id="{5E0911AF-DD5D-75D0-872D-8534710F9132}"/>
+              </a:ext>
+            </a:extLst>
+          </p:cNvPr>
+          <p:cNvPicPr>
+            <a:picLocks noChangeAspect="1" noChangeArrowheads="1"/>
+          </p:cNvPicPr>
+          <p:nvPr/>
+        </p:nvPicPr>
+        <p:blipFill rotWithShape="1">
+          <a:blip r:embed="rId2">
+            <a:extLst>
+              <a:ext uri="{28A0092B-C50C-407E-A947-70E740481C1C}">
+                <a14:useLocalDpi xmlns:a14="http://schemas.microsoft.com/office/drawing/2010/main" val="0"/>
+              </a:ext>
+            </a:extLst>
+          </a:blip>
+          <a:srcRect t="34386" b="31789"/>
+          <a:stretch/>
+        </p:blipFill>
+        <p:spPr bwMode="auto">
+          <a:xfrm>
+            <a:off x="7489364" y="375978"/>
+            <a:ext cx="4097153" cy="1039384"/>
+          </a:xfrm>
+          <a:prstGeom prst="rect">
+            <a:avLst/>
+          </a:prstGeom>
+          <a:noFill/>
+          <a:extLst>
+            <a:ext uri="{909E8E84-426E-40DD-AFC4-6F175D3DCCD1}">
+              <a14:hiddenFill xmlns:a14="http://schemas.microsoft.com/office/drawing/2010/main">
+                <a:solidFill>
+                  <a:srgbClr val="FFFFFF"/>
+                </a:solidFill>
+              </a14:hiddenFill>
+            </a:ext>
+          </a:extLst>
+        </p:spPr>
+      </p:pic>
+    </p:spTree>
+    <p:extLst>
+      <p:ext uri="{BB962C8B-B14F-4D97-AF65-F5344CB8AC3E}">
+        <p14:creationId xmlns:p14="http://schemas.microsoft.com/office/powerpoint/2010/main" val="1188193071"/>
+      </p:ext>
+    </p:extLst>
+  </p:cSld>
+  <p:clrMapOvr>
+    <a:masterClrMapping/>
+  </p:clrMapOvr>
+  <p:transition spd="med">
+    <p:pull/>
+  </p:transition>
+</p:sld>
+</file>
+
+<file path=ppt/slides/slide17.xml><?xml version="1.0" encoding="utf-8"?>
+<p:sld xmlns:a="http://schemas.openxmlformats.org/drawingml/2006/main" xmlns:r="http://schemas.openxmlformats.org/officeDocument/2006/relationships" xmlns:p="http://schemas.openxmlformats.org/presentationml/2006/main">
+  <p:cSld>
+    <p:spTree>
+      <p:nvGrpSpPr>
+        <p:cNvPr id="1" name=""/>
+        <p:cNvGrpSpPr/>
+        <p:nvPr/>
+      </p:nvGrpSpPr>
+      <p:grpSpPr>
+        <a:xfrm>
+          <a:off x="0" y="0"/>
+          <a:ext cx="0" cy="0"/>
+          <a:chOff x="0" y="0"/>
+          <a:chExt cx="0" cy="0"/>
+        </a:xfrm>
+      </p:grpSpPr>
       <p:pic>
         <p:nvPicPr>
           <p:cNvPr id="4098" name="Picture 2" descr="Filtrer Portable Png - Image gratuite sur Pixabay">
@@ -13010,536 +13793,6 @@
 </p:sld>
 </file>
 
-<file path=ppt/slides/slide17.xml><?xml version="1.0" encoding="utf-8"?>
-<p:sld xmlns:a="http://schemas.openxmlformats.org/drawingml/2006/main" xmlns:r="http://schemas.openxmlformats.org/officeDocument/2006/relationships" xmlns:p="http://schemas.openxmlformats.org/presentationml/2006/main">
-  <p:cSld>
-    <p:spTree>
-      <p:nvGrpSpPr>
-        <p:cNvPr id="1" name=""/>
-        <p:cNvGrpSpPr/>
-        <p:nvPr/>
-      </p:nvGrpSpPr>
-      <p:grpSpPr>
-        <a:xfrm>
-          <a:off x="0" y="0"/>
-          <a:ext cx="0" cy="0"/>
-          <a:chOff x="0" y="0"/>
-          <a:chExt cx="0" cy="0"/>
-        </a:xfrm>
-      </p:grpSpPr>
-      <p:sp>
-        <p:nvSpPr>
-          <p:cNvPr id="11" name="Titre 1">
-            <a:extLst>
-              <a:ext uri="{FF2B5EF4-FFF2-40B4-BE49-F238E27FC236}">
-                <a16:creationId xmlns:a16="http://schemas.microsoft.com/office/drawing/2014/main" id="{123CE6CF-D91B-D2E4-4DD4-CBF0694CCA01}"/>
-              </a:ext>
-            </a:extLst>
-          </p:cNvPr>
-          <p:cNvSpPr>
-            <a:spLocks noGrp="1"/>
-          </p:cNvSpPr>
-          <p:nvPr>
-            <p:ph type="title"/>
-          </p:nvPr>
-        </p:nvSpPr>
-        <p:spPr>
-          <a:xfrm>
-            <a:off x="838343" y="520616"/>
-            <a:ext cx="7822578" cy="750108"/>
-          </a:xfrm>
-        </p:spPr>
-        <p:txBody>
-          <a:bodyPr anchor="t">
-            <a:normAutofit/>
-          </a:bodyPr>
-          <a:lstStyle/>
-          <a:p>
-            <a:r>
-              <a:rPr lang="fr-CH">
-                <a:latin typeface="Aharoni" panose="02010803020104030203" pitchFamily="2" charset="-79"/>
-                <a:cs typeface="Aharoni" panose="02010803020104030203" pitchFamily="2" charset="-79"/>
-              </a:rPr>
-              <a:t>Outils utilisés</a:t>
-            </a:r>
-          </a:p>
-        </p:txBody>
-      </p:sp>
-      <p:sp>
-        <p:nvSpPr>
-          <p:cNvPr id="8" name="Titre 1">
-            <a:extLst>
-              <a:ext uri="{FF2B5EF4-FFF2-40B4-BE49-F238E27FC236}">
-                <a16:creationId xmlns:a16="http://schemas.microsoft.com/office/drawing/2014/main" id="{893DBA4A-638D-088C-A287-B6746B285636}"/>
-              </a:ext>
-            </a:extLst>
-          </p:cNvPr>
-          <p:cNvSpPr txBox="1">
-            <a:spLocks/>
-          </p:cNvSpPr>
-          <p:nvPr/>
-        </p:nvSpPr>
-        <p:spPr>
-          <a:xfrm>
-            <a:off x="838200" y="2065078"/>
-            <a:ext cx="5467709" cy="4016545"/>
-          </a:xfrm>
-          <a:prstGeom prst="rect">
-            <a:avLst/>
-          </a:prstGeom>
-        </p:spPr>
-        <p:txBody>
-          <a:bodyPr vert="horz" lIns="91440" tIns="45720" rIns="91440" bIns="45720" rtlCol="0" anchor="t">
-            <a:normAutofit fontScale="97500"/>
-          </a:bodyPr>
-          <a:lstStyle>
-            <a:lvl1pPr algn="l" defTabSz="914400" rtl="0" eaLnBrk="1" latinLnBrk="0" hangingPunct="1">
-              <a:lnSpc>
-                <a:spcPct val="90000"/>
-              </a:lnSpc>
-              <a:spcBef>
-                <a:spcPct val="0"/>
-              </a:spcBef>
-              <a:buNone/>
-              <a:defRPr sz="4400" kern="1200">
-                <a:solidFill>
-                  <a:schemeClr val="tx1"/>
-                </a:solidFill>
-                <a:latin typeface="+mj-lt"/>
-                <a:ea typeface="+mj-ea"/>
-                <a:cs typeface="+mj-cs"/>
-              </a:defRPr>
-            </a:lvl1pPr>
-          </a:lstStyle>
-          <a:p>
-            <a:pPr marL="285750" indent="-285750">
-              <a:spcBef>
-                <a:spcPts val="1000"/>
-              </a:spcBef>
-              <a:buFont typeface="Arial" panose="020B0604020202020204" pitchFamily="34" charset="0"/>
-              <a:buChar char="•"/>
-            </a:pPr>
-            <a:endParaRPr lang="fr-CH" sz="300">
-              <a:solidFill>
-                <a:srgbClr val="000000"/>
-              </a:solidFill>
-              <a:latin typeface="Bahnschrift" panose="020B0502040204020203" pitchFamily="34" charset="0"/>
-              <a:ea typeface="+mn-ea"/>
-              <a:cs typeface="+mn-cs"/>
-            </a:endParaRPr>
-          </a:p>
-          <a:p>
-            <a:pPr marL="285750" indent="-285750">
-              <a:spcBef>
-                <a:spcPts val="1000"/>
-              </a:spcBef>
-              <a:buFont typeface="Arial" panose="020B0604020202020204" pitchFamily="34" charset="0"/>
-              <a:buChar char="•"/>
-            </a:pPr>
-            <a:endParaRPr lang="fr-CH" sz="2900" kern="1200">
-              <a:solidFill>
-                <a:srgbClr val="000000"/>
-              </a:solidFill>
-              <a:effectLst/>
-              <a:latin typeface="Bahnschrift" panose="020B0502040204020203" pitchFamily="34" charset="0"/>
-              <a:ea typeface="+mn-ea"/>
-              <a:cs typeface="+mn-cs"/>
-            </a:endParaRPr>
-          </a:p>
-        </p:txBody>
-      </p:sp>
-      <p:sp>
-        <p:nvSpPr>
-          <p:cNvPr id="5" name="ZoneTexte 4">
-            <a:extLst>
-              <a:ext uri="{FF2B5EF4-FFF2-40B4-BE49-F238E27FC236}">
-                <a16:creationId xmlns:a16="http://schemas.microsoft.com/office/drawing/2014/main" id="{865DD11E-FFC6-F310-93EA-264AA40E601E}"/>
-              </a:ext>
-            </a:extLst>
-          </p:cNvPr>
-          <p:cNvSpPr txBox="1"/>
-          <p:nvPr/>
-        </p:nvSpPr>
-        <p:spPr>
-          <a:xfrm>
-            <a:off x="6883880" y="6581001"/>
-            <a:ext cx="5308122" cy="276999"/>
-          </a:xfrm>
-          <a:prstGeom prst="rect">
-            <a:avLst/>
-          </a:prstGeom>
-          <a:noFill/>
-        </p:spPr>
-        <p:txBody>
-          <a:bodyPr wrap="square" rtlCol="0">
-            <a:spAutoFit/>
-          </a:bodyPr>
-          <a:lstStyle/>
-          <a:p>
-            <a:pPr algn="r"/>
-            <a:r>
-              <a:rPr lang="fr-CH" sz="1200"/>
-              <a:t>https://plotly.com/dash/</a:t>
-            </a:r>
-          </a:p>
-        </p:txBody>
-      </p:sp>
-      <p:sp>
-        <p:nvSpPr>
-          <p:cNvPr id="3" name="Titre 1">
-            <a:extLst>
-              <a:ext uri="{FF2B5EF4-FFF2-40B4-BE49-F238E27FC236}">
-                <a16:creationId xmlns:a16="http://schemas.microsoft.com/office/drawing/2014/main" id="{A9CAA3FF-D24A-B906-0BDE-7B0DCFCB7E1C}"/>
-              </a:ext>
-            </a:extLst>
-          </p:cNvPr>
-          <p:cNvSpPr txBox="1">
-            <a:spLocks/>
-          </p:cNvSpPr>
-          <p:nvPr/>
-        </p:nvSpPr>
-        <p:spPr>
-          <a:xfrm>
-            <a:off x="838200" y="2065078"/>
-            <a:ext cx="9556630" cy="4272306"/>
-          </a:xfrm>
-          <a:prstGeom prst="rect">
-            <a:avLst/>
-          </a:prstGeom>
-        </p:spPr>
-        <p:txBody>
-          <a:bodyPr vert="horz" lIns="91440" tIns="45720" rIns="91440" bIns="45720" rtlCol="0" anchor="t">
-            <a:normAutofit fontScale="97500"/>
-          </a:bodyPr>
-          <a:lstStyle>
-            <a:lvl1pPr algn="l" defTabSz="914400" rtl="0" eaLnBrk="1" latinLnBrk="0" hangingPunct="1">
-              <a:lnSpc>
-                <a:spcPct val="90000"/>
-              </a:lnSpc>
-              <a:spcBef>
-                <a:spcPct val="0"/>
-              </a:spcBef>
-              <a:buNone/>
-              <a:defRPr sz="4400" kern="1200">
-                <a:solidFill>
-                  <a:schemeClr val="tx1"/>
-                </a:solidFill>
-                <a:latin typeface="+mj-lt"/>
-                <a:ea typeface="+mj-ea"/>
-                <a:cs typeface="+mj-cs"/>
-              </a:defRPr>
-            </a:lvl1pPr>
-          </a:lstStyle>
-          <a:p>
-            <a:pPr marL="285750" indent="-285750" algn="l" rtl="0" eaLnBrk="1" latinLnBrk="0" hangingPunct="1">
-              <a:lnSpc>
-                <a:spcPct val="90000"/>
-              </a:lnSpc>
-              <a:spcBef>
-                <a:spcPts val="1000"/>
-              </a:spcBef>
-              <a:spcAft>
-                <a:spcPts val="0"/>
-              </a:spcAft>
-              <a:buFont typeface="Arial" panose="020B0604020202020204" pitchFamily="34" charset="0"/>
-              <a:buChar char="•"/>
-            </a:pPr>
-            <a:r>
-              <a:rPr lang="fr-CH" sz="2900" kern="1200">
-                <a:solidFill>
-                  <a:srgbClr val="000000"/>
-                </a:solidFill>
-                <a:effectLst/>
-                <a:latin typeface="Bahnschrift" panose="020B0502040204020203" pitchFamily="34" charset="0"/>
-                <a:ea typeface="+mn-ea"/>
-                <a:cs typeface="+mn-cs"/>
-              </a:rPr>
-              <a:t>Librairie Python </a:t>
-            </a:r>
-            <a:r>
-              <a:rPr lang="fr-CH" sz="2900" i="1" kern="1200">
-                <a:solidFill>
-                  <a:srgbClr val="000000"/>
-                </a:solidFill>
-                <a:effectLst/>
-                <a:latin typeface="Bahnschrift" panose="020B0502040204020203" pitchFamily="34" charset="0"/>
-                <a:ea typeface="+mn-ea"/>
-                <a:cs typeface="+mn-cs"/>
-              </a:rPr>
-              <a:t>Dash, </a:t>
-            </a:r>
-            <a:r>
-              <a:rPr lang="fr-CH" sz="2900" kern="1200">
-                <a:solidFill>
-                  <a:srgbClr val="000000"/>
-                </a:solidFill>
-                <a:effectLst/>
-                <a:latin typeface="Bahnschrift" panose="020B0502040204020203" pitchFamily="34" charset="0"/>
-                <a:ea typeface="+mn-ea"/>
-                <a:cs typeface="+mn-cs"/>
-              </a:rPr>
-              <a:t>utilisant la librairie Plotly.js</a:t>
-            </a:r>
-          </a:p>
-          <a:p>
-            <a:pPr marL="742950" lvl="1" indent="-285750">
-              <a:lnSpc>
-                <a:spcPct val="90000"/>
-              </a:lnSpc>
-              <a:spcBef>
-                <a:spcPts val="1000"/>
-              </a:spcBef>
-              <a:buFont typeface="Arial" panose="020B0604020202020204" pitchFamily="34" charset="0"/>
-              <a:buChar char="•"/>
-            </a:pPr>
-            <a:r>
-              <a:rPr lang="fr-CH" sz="2000">
-                <a:solidFill>
-                  <a:srgbClr val="000000"/>
-                </a:solidFill>
-                <a:latin typeface="Bahnschrift" panose="020B0502040204020203" pitchFamily="34" charset="0"/>
-              </a:rPr>
-              <a:t>Développement simplifié et accélérée</a:t>
-            </a:r>
-          </a:p>
-          <a:p>
-            <a:pPr marL="742950" lvl="1" indent="-285750">
-              <a:lnSpc>
-                <a:spcPct val="90000"/>
-              </a:lnSpc>
-              <a:spcBef>
-                <a:spcPts val="1000"/>
-              </a:spcBef>
-              <a:buFont typeface="Arial" panose="020B0604020202020204" pitchFamily="34" charset="0"/>
-              <a:buChar char="•"/>
-            </a:pPr>
-            <a:r>
-              <a:rPr lang="fr-CH" sz="2000">
-                <a:solidFill>
-                  <a:srgbClr val="000000"/>
-                </a:solidFill>
-                <a:latin typeface="Bahnschrift" panose="020B0502040204020203" pitchFamily="34" charset="0"/>
-                <a:ea typeface="+mn-ea"/>
-                <a:cs typeface="+mn-cs"/>
-              </a:rPr>
-              <a:t>Assez vite limitée</a:t>
-            </a:r>
-          </a:p>
-          <a:p>
-            <a:pPr marL="742950" lvl="1" indent="-285750">
-              <a:lnSpc>
-                <a:spcPct val="90000"/>
-              </a:lnSpc>
-              <a:spcBef>
-                <a:spcPts val="1000"/>
-              </a:spcBef>
-              <a:buFont typeface="Arial" panose="020B0604020202020204" pitchFamily="34" charset="0"/>
-              <a:buChar char="•"/>
-            </a:pPr>
-            <a:r>
-              <a:rPr lang="fr-CH" sz="2000">
-                <a:solidFill>
-                  <a:srgbClr val="000000"/>
-                </a:solidFill>
-                <a:latin typeface="Bahnschrift" panose="020B0502040204020203" pitchFamily="34" charset="0"/>
-                <a:ea typeface="+mn-ea"/>
-                <a:cs typeface="+mn-cs"/>
-              </a:rPr>
-              <a:t>Code un peu </a:t>
-            </a:r>
-            <a:r>
-              <a:rPr lang="fr-CH" sz="2000" err="1">
-                <a:solidFill>
-                  <a:srgbClr val="000000"/>
-                </a:solidFill>
-                <a:latin typeface="Bahnschrift" panose="020B0502040204020203" pitchFamily="34" charset="0"/>
-                <a:ea typeface="+mn-ea"/>
-                <a:cs typeface="+mn-cs"/>
-              </a:rPr>
-              <a:t>fouilli</a:t>
-            </a:r>
-            <a:endParaRPr lang="fr-CH" sz="2000">
-              <a:solidFill>
-                <a:srgbClr val="000000"/>
-              </a:solidFill>
-              <a:latin typeface="Bahnschrift" panose="020B0502040204020203" pitchFamily="34" charset="0"/>
-              <a:ea typeface="+mn-ea"/>
-              <a:cs typeface="+mn-cs"/>
-            </a:endParaRPr>
-          </a:p>
-          <a:p>
-            <a:pPr marL="742950" lvl="1" indent="-285750">
-              <a:lnSpc>
-                <a:spcPct val="90000"/>
-              </a:lnSpc>
-              <a:spcBef>
-                <a:spcPts val="1000"/>
-              </a:spcBef>
-              <a:buFont typeface="Arial" panose="020B0604020202020204" pitchFamily="34" charset="0"/>
-              <a:buChar char="•"/>
-            </a:pPr>
-            <a:r>
-              <a:rPr lang="fr-CH" sz="2000">
-                <a:solidFill>
-                  <a:srgbClr val="000000"/>
-                </a:solidFill>
-                <a:latin typeface="Bahnschrift" panose="020B0502040204020203" pitchFamily="34" charset="0"/>
-              </a:rPr>
-              <a:t>Technologie nouvelle</a:t>
-            </a:r>
-            <a:endParaRPr lang="fr-CH" sz="2100">
-              <a:solidFill>
-                <a:srgbClr val="000000"/>
-              </a:solidFill>
-              <a:latin typeface="Bahnschrift" panose="020B0502040204020203" pitchFamily="34" charset="0"/>
-              <a:ea typeface="+mn-ea"/>
-              <a:cs typeface="+mn-cs"/>
-            </a:endParaRPr>
-          </a:p>
-          <a:p>
-            <a:pPr algn="l" rtl="0" eaLnBrk="1" latinLnBrk="0" hangingPunct="1">
-              <a:lnSpc>
-                <a:spcPct val="90000"/>
-              </a:lnSpc>
-              <a:spcBef>
-                <a:spcPts val="1000"/>
-              </a:spcBef>
-              <a:spcAft>
-                <a:spcPts val="0"/>
-              </a:spcAft>
-            </a:pPr>
-            <a:endParaRPr lang="fr-CH" sz="2900" kern="1200">
-              <a:solidFill>
-                <a:srgbClr val="000000"/>
-              </a:solidFill>
-              <a:effectLst/>
-              <a:latin typeface="Bahnschrift" panose="020B0502040204020203" pitchFamily="34" charset="0"/>
-              <a:ea typeface="+mn-ea"/>
-              <a:cs typeface="+mn-cs"/>
-            </a:endParaRPr>
-          </a:p>
-          <a:p>
-            <a:pPr marL="285750" indent="-285750" algn="l" rtl="0" eaLnBrk="1" latinLnBrk="0" hangingPunct="1">
-              <a:lnSpc>
-                <a:spcPct val="90000"/>
-              </a:lnSpc>
-              <a:spcBef>
-                <a:spcPts val="1000"/>
-              </a:spcBef>
-              <a:spcAft>
-                <a:spcPts val="0"/>
-              </a:spcAft>
-              <a:buFont typeface="Arial" panose="020B0604020202020204" pitchFamily="34" charset="0"/>
-              <a:buChar char="•"/>
-            </a:pPr>
-            <a:r>
-              <a:rPr lang="fr-CH" sz="2900" kern="1200">
-                <a:solidFill>
-                  <a:srgbClr val="000000"/>
-                </a:solidFill>
-                <a:effectLst/>
-                <a:latin typeface="Bahnschrift" panose="020B0502040204020203" pitchFamily="34" charset="0"/>
-                <a:ea typeface="+mn-ea"/>
-                <a:cs typeface="+mn-cs"/>
-              </a:rPr>
-              <a:t>Python et </a:t>
-            </a:r>
-            <a:r>
-              <a:rPr lang="fr-CH" sz="2900" kern="1200" err="1">
-                <a:solidFill>
-                  <a:srgbClr val="000000"/>
-                </a:solidFill>
-                <a:effectLst/>
-                <a:latin typeface="Bahnschrift" panose="020B0502040204020203" pitchFamily="34" charset="0"/>
-                <a:ea typeface="+mn-ea"/>
-                <a:cs typeface="+mn-cs"/>
-              </a:rPr>
-              <a:t>Jupyter</a:t>
-            </a:r>
-            <a:r>
-              <a:rPr lang="fr-CH" sz="2900">
-                <a:solidFill>
-                  <a:srgbClr val="000000"/>
-                </a:solidFill>
-                <a:latin typeface="Bahnschrift" panose="020B0502040204020203" pitchFamily="34" charset="0"/>
-                <a:ea typeface="+mn-ea"/>
-                <a:cs typeface="+mn-cs"/>
-              </a:rPr>
-              <a:t> Notebook pour le traitement et le création des données</a:t>
-            </a:r>
-            <a:endParaRPr lang="fr-CH" sz="2900" kern="1200">
-              <a:solidFill>
-                <a:srgbClr val="000000"/>
-              </a:solidFill>
-              <a:effectLst/>
-              <a:latin typeface="Bahnschrift" panose="020B0502040204020203" pitchFamily="34" charset="0"/>
-              <a:ea typeface="+mn-ea"/>
-              <a:cs typeface="+mn-cs"/>
-            </a:endParaRPr>
-          </a:p>
-        </p:txBody>
-      </p:sp>
-      <p:pic>
-        <p:nvPicPr>
-          <p:cNvPr id="17412" name="Picture 4" descr="RAPIDS + Plotly Dash | RAPIDS">
-            <a:extLst>
-              <a:ext uri="{FF2B5EF4-FFF2-40B4-BE49-F238E27FC236}">
-                <a16:creationId xmlns:a16="http://schemas.microsoft.com/office/drawing/2014/main" id="{5E0911AF-DD5D-75D0-872D-8534710F9132}"/>
-              </a:ext>
-            </a:extLst>
-          </p:cNvPr>
-          <p:cNvPicPr>
-            <a:picLocks noChangeAspect="1" noChangeArrowheads="1"/>
-          </p:cNvPicPr>
-          <p:nvPr/>
-        </p:nvPicPr>
-        <p:blipFill rotWithShape="1">
-          <a:blip r:embed="rId2">
-            <a:extLst>
-              <a:ext uri="{28A0092B-C50C-407E-A947-70E740481C1C}">
-                <a14:useLocalDpi xmlns:a14="http://schemas.microsoft.com/office/drawing/2010/main" val="0"/>
-              </a:ext>
-            </a:extLst>
-          </a:blip>
-          <a:srcRect t="34386" b="31789"/>
-          <a:stretch/>
-        </p:blipFill>
-        <p:spPr bwMode="auto">
-          <a:xfrm>
-            <a:off x="7489364" y="375978"/>
-            <a:ext cx="4097153" cy="1039384"/>
-          </a:xfrm>
-          <a:prstGeom prst="rect">
-            <a:avLst/>
-          </a:prstGeom>
-          <a:noFill/>
-          <a:extLst>
-            <a:ext uri="{909E8E84-426E-40DD-AFC4-6F175D3DCCD1}">
-              <a14:hiddenFill xmlns:a14="http://schemas.microsoft.com/office/drawing/2010/main">
-                <a:solidFill>
-                  <a:srgbClr val="FFFFFF"/>
-                </a:solidFill>
-              </a14:hiddenFill>
-            </a:ext>
-          </a:extLst>
-        </p:spPr>
-      </p:pic>
-    </p:spTree>
-    <p:extLst>
-      <p:ext uri="{BB962C8B-B14F-4D97-AF65-F5344CB8AC3E}">
-        <p14:creationId xmlns:p14="http://schemas.microsoft.com/office/powerpoint/2010/main" val="1188193071"/>
-      </p:ext>
-    </p:extLst>
-  </p:cSld>
-  <p:clrMapOvr>
-    <a:masterClrMapping/>
-  </p:clrMapOvr>
-  <p:transition spd="med">
-    <p:pull/>
-  </p:transition>
-</p:sld>
-</file>
-
 <file path=ppt/slides/slide18.xml><?xml version="1.0" encoding="utf-8"?>
 <p:sld xmlns:a="http://schemas.openxmlformats.org/drawingml/2006/main" xmlns:r="http://schemas.openxmlformats.org/officeDocument/2006/relationships" xmlns:p="http://schemas.openxmlformats.org/presentationml/2006/main">
   <p:cSld>
@@ -13998,6 +14251,339 @@
 </p:sld>
 </file>
 
+<file path=ppt/slides/slide19.xml><?xml version="1.0" encoding="utf-8"?>
+<p:sld xmlns:a="http://schemas.openxmlformats.org/drawingml/2006/main" xmlns:r="http://schemas.openxmlformats.org/officeDocument/2006/relationships" xmlns:p="http://schemas.openxmlformats.org/presentationml/2006/main">
+  <p:cSld>
+    <p:spTree>
+      <p:nvGrpSpPr>
+        <p:cNvPr id="1" name=""/>
+        <p:cNvGrpSpPr/>
+        <p:nvPr/>
+      </p:nvGrpSpPr>
+      <p:grpSpPr>
+        <a:xfrm>
+          <a:off x="0" y="0"/>
+          <a:ext cx="0" cy="0"/>
+          <a:chOff x="0" y="0"/>
+          <a:chExt cx="0" cy="0"/>
+        </a:xfrm>
+      </p:grpSpPr>
+      <p:sp>
+        <p:nvSpPr>
+          <p:cNvPr id="11" name="Titre 1">
+            <a:extLst>
+              <a:ext uri="{FF2B5EF4-FFF2-40B4-BE49-F238E27FC236}">
+                <a16:creationId xmlns:a16="http://schemas.microsoft.com/office/drawing/2014/main" id="{123CE6CF-D91B-D2E4-4DD4-CBF0694CCA01}"/>
+              </a:ext>
+            </a:extLst>
+          </p:cNvPr>
+          <p:cNvSpPr>
+            <a:spLocks noGrp="1"/>
+          </p:cNvSpPr>
+          <p:nvPr>
+            <p:ph type="title"/>
+          </p:nvPr>
+        </p:nvSpPr>
+        <p:spPr>
+          <a:xfrm>
+            <a:off x="838343" y="520616"/>
+            <a:ext cx="7822578" cy="1812897"/>
+          </a:xfrm>
+        </p:spPr>
+        <p:txBody>
+          <a:bodyPr anchor="t">
+            <a:noAutofit/>
+          </a:bodyPr>
+          <a:lstStyle/>
+          <a:p>
+            <a:r>
+              <a:rPr lang="fr-CH" sz="8800">
+                <a:latin typeface="Aharoni"/>
+                <a:cs typeface="Aharoni"/>
+              </a:rPr>
+              <a:t>Merci !</a:t>
+            </a:r>
+            <a:br>
+              <a:rPr lang="fr-CH" sz="8800">
+                <a:latin typeface="Aharoni"/>
+                <a:cs typeface="Aharoni"/>
+              </a:rPr>
+            </a:br>
+            <a:br>
+              <a:rPr lang="fr-CH" sz="8800">
+                <a:latin typeface="Aharoni"/>
+                <a:cs typeface="Aharoni"/>
+              </a:rPr>
+            </a:br>
+            <a:r>
+              <a:rPr lang="fr-CH" sz="8800">
+                <a:latin typeface="Aharoni"/>
+                <a:cs typeface="Aharoni"/>
+              </a:rPr>
+              <a:t>Questions ? </a:t>
+            </a:r>
+          </a:p>
+        </p:txBody>
+      </p:sp>
+      <p:sp>
+        <p:nvSpPr>
+          <p:cNvPr id="8" name="Titre 1">
+            <a:extLst>
+              <a:ext uri="{FF2B5EF4-FFF2-40B4-BE49-F238E27FC236}">
+                <a16:creationId xmlns:a16="http://schemas.microsoft.com/office/drawing/2014/main" id="{893DBA4A-638D-088C-A287-B6746B285636}"/>
+              </a:ext>
+            </a:extLst>
+          </p:cNvPr>
+          <p:cNvSpPr txBox="1">
+            <a:spLocks/>
+          </p:cNvSpPr>
+          <p:nvPr/>
+        </p:nvSpPr>
+        <p:spPr>
+          <a:xfrm>
+            <a:off x="838200" y="2065078"/>
+            <a:ext cx="5467709" cy="4016545"/>
+          </a:xfrm>
+          <a:prstGeom prst="rect">
+            <a:avLst/>
+          </a:prstGeom>
+        </p:spPr>
+        <p:txBody>
+          <a:bodyPr vert="horz" lIns="91440" tIns="45720" rIns="91440" bIns="45720" rtlCol="0" anchor="t">
+            <a:normAutofit fontScale="97500"/>
+          </a:bodyPr>
+          <a:lstStyle>
+            <a:lvl1pPr algn="l" defTabSz="914400" rtl="0" eaLnBrk="1" latinLnBrk="0" hangingPunct="1">
+              <a:lnSpc>
+                <a:spcPct val="90000"/>
+              </a:lnSpc>
+              <a:spcBef>
+                <a:spcPct val="0"/>
+              </a:spcBef>
+              <a:buNone/>
+              <a:defRPr sz="4400" kern="1200">
+                <a:solidFill>
+                  <a:schemeClr val="tx1"/>
+                </a:solidFill>
+                <a:latin typeface="+mj-lt"/>
+                <a:ea typeface="+mj-ea"/>
+                <a:cs typeface="+mj-cs"/>
+              </a:defRPr>
+            </a:lvl1pPr>
+          </a:lstStyle>
+          <a:p>
+            <a:pPr marL="285750" indent="-285750">
+              <a:spcBef>
+                <a:spcPts val="1000"/>
+              </a:spcBef>
+              <a:buFont typeface="Arial" panose="020B0604020202020204" pitchFamily="34" charset="0"/>
+              <a:buChar char="•"/>
+            </a:pPr>
+            <a:endParaRPr lang="fr-CH" sz="300">
+              <a:solidFill>
+                <a:srgbClr val="000000"/>
+              </a:solidFill>
+              <a:latin typeface="Bahnschrift" panose="020B0502040204020203" pitchFamily="34" charset="0"/>
+              <a:ea typeface="+mn-ea"/>
+              <a:cs typeface="+mn-cs"/>
+            </a:endParaRPr>
+          </a:p>
+          <a:p>
+            <a:pPr marL="285750" indent="-285750">
+              <a:spcBef>
+                <a:spcPts val="1000"/>
+              </a:spcBef>
+              <a:buFont typeface="Arial" panose="020B0604020202020204" pitchFamily="34" charset="0"/>
+              <a:buChar char="•"/>
+            </a:pPr>
+            <a:endParaRPr lang="fr-CH" sz="2900" kern="1200">
+              <a:solidFill>
+                <a:srgbClr val="000000"/>
+              </a:solidFill>
+              <a:effectLst/>
+              <a:latin typeface="Bahnschrift" panose="020B0502040204020203" pitchFamily="34" charset="0"/>
+              <a:ea typeface="+mn-ea"/>
+              <a:cs typeface="+mn-cs"/>
+            </a:endParaRPr>
+          </a:p>
+        </p:txBody>
+      </p:sp>
+      <p:sp>
+        <p:nvSpPr>
+          <p:cNvPr id="2" name="ZoneTexte 1">
+            <a:extLst>
+              <a:ext uri="{FF2B5EF4-FFF2-40B4-BE49-F238E27FC236}">
+                <a16:creationId xmlns:a16="http://schemas.microsoft.com/office/drawing/2014/main" id="{FE26E657-8F99-63D2-90D3-22E2F7E59BCA}"/>
+              </a:ext>
+            </a:extLst>
+          </p:cNvPr>
+          <p:cNvSpPr txBox="1"/>
+          <p:nvPr/>
+        </p:nvSpPr>
+        <p:spPr>
+          <a:xfrm>
+            <a:off x="6883880" y="6581001"/>
+            <a:ext cx="5308122" cy="276999"/>
+          </a:xfrm>
+          <a:prstGeom prst="rect">
+            <a:avLst/>
+          </a:prstGeom>
+          <a:noFill/>
+        </p:spPr>
+        <p:txBody>
+          <a:bodyPr wrap="square" rtlCol="0">
+            <a:spAutoFit/>
+          </a:bodyPr>
+          <a:lstStyle/>
+          <a:p>
+            <a:pPr algn="r"/>
+            <a:r>
+              <a:rPr lang="fr-CH" sz="1200">
+                <a:solidFill>
+                  <a:schemeClr val="bg1"/>
+                </a:solidFill>
+              </a:rPr>
+              <a:t>https://www.nba.com/bulls/news/jordanhof_jackson_090827.html</a:t>
+            </a:r>
+          </a:p>
+        </p:txBody>
+      </p:sp>
+      <p:grpSp>
+        <p:nvGrpSpPr>
+          <p:cNvPr id="3" name="Groupe 2">
+            <a:extLst>
+              <a:ext uri="{FF2B5EF4-FFF2-40B4-BE49-F238E27FC236}">
+                <a16:creationId xmlns:a16="http://schemas.microsoft.com/office/drawing/2014/main" id="{EB620A33-B478-F856-D35B-FF421AA134B5}"/>
+              </a:ext>
+            </a:extLst>
+          </p:cNvPr>
+          <p:cNvGrpSpPr/>
+          <p:nvPr/>
+        </p:nvGrpSpPr>
+        <p:grpSpPr>
+          <a:xfrm>
+            <a:off x="8131084" y="1363056"/>
+            <a:ext cx="2408065" cy="3716478"/>
+            <a:chOff x="8945592" y="2269772"/>
+            <a:chExt cx="1876450" cy="2896012"/>
+          </a:xfrm>
+        </p:grpSpPr>
+        <p:pic>
+          <p:nvPicPr>
+            <p:cNvPr id="1026" name="Picture 2">
+              <a:extLst>
+                <a:ext uri="{FF2B5EF4-FFF2-40B4-BE49-F238E27FC236}">
+                  <a16:creationId xmlns:a16="http://schemas.microsoft.com/office/drawing/2014/main" id="{222419F1-9E45-186D-2F89-BD8A8BC94375}"/>
+                </a:ext>
+              </a:extLst>
+            </p:cNvPr>
+            <p:cNvPicPr>
+              <a:picLocks noChangeAspect="1" noChangeArrowheads="1"/>
+            </p:cNvPicPr>
+            <p:nvPr/>
+          </p:nvPicPr>
+          <p:blipFill>
+            <a:blip r:embed="rId3">
+              <a:duotone>
+                <a:schemeClr val="accent4">
+                  <a:shade val="45000"/>
+                  <a:satMod val="135000"/>
+                </a:schemeClr>
+                <a:prstClr val="white"/>
+              </a:duotone>
+              <a:extLst>
+                <a:ext uri="{28A0092B-C50C-407E-A947-70E740481C1C}">
+                  <a14:useLocalDpi xmlns:a14="http://schemas.microsoft.com/office/drawing/2010/main" val="0"/>
+                </a:ext>
+              </a:extLst>
+            </a:blip>
+            <a:srcRect/>
+            <a:stretch>
+              <a:fillRect/>
+            </a:stretch>
+          </p:blipFill>
+          <p:spPr bwMode="auto">
+            <a:xfrm>
+              <a:off x="9476032" y="4356791"/>
+              <a:ext cx="815570" cy="808993"/>
+            </a:xfrm>
+            <a:prstGeom prst="rect">
+              <a:avLst/>
+            </a:prstGeom>
+            <a:noFill/>
+            <a:extLst>
+              <a:ext uri="{909E8E84-426E-40DD-AFC4-6F175D3DCCD1}">
+                <a14:hiddenFill xmlns:a14="http://schemas.microsoft.com/office/drawing/2010/main">
+                  <a:solidFill>
+                    <a:srgbClr val="FFFFFF"/>
+                  </a:solidFill>
+                </a14:hiddenFill>
+              </a:ext>
+            </a:extLst>
+          </p:spPr>
+        </p:pic>
+        <p:pic>
+          <p:nvPicPr>
+            <p:cNvPr id="1028" name="Picture 4" descr="Icône de question jaune (symbole png)">
+              <a:extLst>
+                <a:ext uri="{FF2B5EF4-FFF2-40B4-BE49-F238E27FC236}">
+                  <a16:creationId xmlns:a16="http://schemas.microsoft.com/office/drawing/2014/main" id="{0FBDEC46-D595-A597-D19F-AC459E7F4F3C}"/>
+                </a:ext>
+              </a:extLst>
+            </p:cNvPr>
+            <p:cNvPicPr>
+              <a:picLocks noChangeAspect="1" noChangeArrowheads="1"/>
+            </p:cNvPicPr>
+            <p:nvPr/>
+          </p:nvPicPr>
+          <p:blipFill rotWithShape="1">
+            <a:blip r:embed="rId4">
+              <a:extLst>
+                <a:ext uri="{28A0092B-C50C-407E-A947-70E740481C1C}">
+                  <a14:useLocalDpi xmlns:a14="http://schemas.microsoft.com/office/drawing/2010/main" val="0"/>
+                </a:ext>
+              </a:extLst>
+            </a:blip>
+            <a:srcRect l="19792" r="15576" b="33201"/>
+            <a:stretch/>
+          </p:blipFill>
+          <p:spPr bwMode="auto">
+            <a:xfrm>
+              <a:off x="8945592" y="2269772"/>
+              <a:ext cx="1876450" cy="1939371"/>
+            </a:xfrm>
+            <a:prstGeom prst="rect">
+              <a:avLst/>
+            </a:prstGeom>
+            <a:noFill/>
+            <a:extLst>
+              <a:ext uri="{909E8E84-426E-40DD-AFC4-6F175D3DCCD1}">
+                <a14:hiddenFill xmlns:a14="http://schemas.microsoft.com/office/drawing/2010/main">
+                  <a:solidFill>
+                    <a:srgbClr val="FFFFFF"/>
+                  </a:solidFill>
+                </a14:hiddenFill>
+              </a:ext>
+            </a:extLst>
+          </p:spPr>
+        </p:pic>
+      </p:grpSp>
+    </p:spTree>
+    <p:extLst>
+      <p:ext uri="{BB962C8B-B14F-4D97-AF65-F5344CB8AC3E}">
+        <p14:creationId xmlns:p14="http://schemas.microsoft.com/office/powerpoint/2010/main" val="3701858593"/>
+      </p:ext>
+    </p:extLst>
+  </p:cSld>
+  <p:clrMapOvr>
+    <a:masterClrMapping/>
+  </p:clrMapOvr>
+  <p:transition spd="med">
+    <p:pull/>
+  </p:transition>
+</p:sld>
+</file>
+
 <file path=ppt/slides/slide2.xml><?xml version="1.0" encoding="utf-8"?>
 <p:sld xmlns:a="http://schemas.openxmlformats.org/drawingml/2006/main" xmlns:r="http://schemas.openxmlformats.org/officeDocument/2006/relationships" xmlns:p="http://schemas.openxmlformats.org/presentationml/2006/main">
   <p:cSld>
@@ -14105,8 +14691,8 @@
             </a:pPr>
             <a:r>
               <a:rPr lang="fr-CH" sz="3600" b="1">
-                <a:latin typeface="Bahnschrift" panose="020B0502040204020203" pitchFamily="34" charset="0"/>
-                <a:cs typeface="Aharoni" panose="02010803020104030203" pitchFamily="2" charset="-79"/>
+                <a:latin typeface="Bahnschrift"/>
+                <a:cs typeface="Aharoni"/>
               </a:rPr>
               <a:t>Intention et public cible</a:t>
             </a:r>
@@ -14120,8 +14706,8 @@
             </a:pPr>
             <a:r>
               <a:rPr lang="fr-CH" sz="3600" b="1">
-                <a:latin typeface="Bahnschrift" panose="020B0502040204020203" pitchFamily="34" charset="0"/>
-                <a:cs typeface="Aharoni" panose="02010803020104030203" pitchFamily="2" charset="-79"/>
+                <a:latin typeface="Bahnschrift"/>
+                <a:cs typeface="Aharoni"/>
               </a:rPr>
               <a:t>Choix des données</a:t>
             </a:r>
@@ -14140,32 +14726,6 @@
               </a:rPr>
               <a:t>Représentations</a:t>
             </a:r>
-          </a:p>
-          <a:p>
-            <a:endParaRPr lang="fr-CH" sz="3600">
-              <a:latin typeface="Aharoni" panose="02010803020104030203" pitchFamily="2" charset="-79"/>
-              <a:cs typeface="Aharoni" panose="02010803020104030203" pitchFamily="2" charset="-79"/>
-            </a:endParaRPr>
-          </a:p>
-          <a:p>
-            <a:pPr marL="571500" indent="-571500">
-              <a:buFont typeface="Wingdings" panose="05000000000000000000" pitchFamily="2" charset="2"/>
-              <a:buChar char="§"/>
-            </a:pPr>
-            <a:endParaRPr lang="fr-CH" sz="3600">
-              <a:latin typeface="Aharoni" panose="02010803020104030203" pitchFamily="2" charset="-79"/>
-              <a:cs typeface="Aharoni" panose="02010803020104030203" pitchFamily="2" charset="-79"/>
-            </a:endParaRPr>
-          </a:p>
-          <a:p>
-            <a:pPr marL="571500" indent="-571500">
-              <a:buFont typeface="Wingdings" panose="05000000000000000000" pitchFamily="2" charset="2"/>
-              <a:buChar char="§"/>
-            </a:pPr>
-            <a:endParaRPr lang="fr-CH" sz="3600">
-              <a:latin typeface="Aharoni" panose="02010803020104030203" pitchFamily="2" charset="-79"/>
-              <a:cs typeface="Aharoni" panose="02010803020104030203" pitchFamily="2" charset="-79"/>
-            </a:endParaRPr>
           </a:p>
           <a:p>
             <a:pPr marL="571500" indent="-571500">
@@ -14238,11 +14798,15 @@
             </a:pPr>
             <a:r>
               <a:rPr lang="fr-CH" sz="3600" b="1">
-                <a:latin typeface="Bahnschrift" panose="020B0502040204020203" pitchFamily="34" charset="0"/>
-                <a:cs typeface="Aharoni" panose="02010803020104030203" pitchFamily="2" charset="-79"/>
+                <a:latin typeface="Bahnschrift"/>
+                <a:cs typeface="Aharoni"/>
               </a:rPr>
-              <a:t>Présentation des interaction</a:t>
-            </a:r>
+              <a:t>Présentation et interactions</a:t>
+            </a:r>
+            <a:endParaRPr lang="fr-CH" sz="3600" b="1">
+              <a:latin typeface="Bahnschrift" panose="020B0502040204020203" pitchFamily="34" charset="0"/>
+              <a:cs typeface="Aharoni" panose="02010803020104030203" pitchFamily="2" charset="-79"/>
+            </a:endParaRPr>
           </a:p>
           <a:p>
             <a:pPr marL="742950" indent="-742950">
@@ -14257,7 +14821,7 @@
                 <a:latin typeface="Bahnschrift" panose="020B0502040204020203" pitchFamily="34" charset="0"/>
                 <a:cs typeface="Aharoni" panose="02010803020104030203" pitchFamily="2" charset="-79"/>
               </a:rPr>
-              <a:t>Démonstration</a:t>
+              <a:t>Outils utilisés</a:t>
             </a:r>
           </a:p>
           <a:p>
@@ -14270,10 +14834,10 @@
             </a:pPr>
             <a:r>
               <a:rPr lang="fr-CH" sz="3600" b="1">
-                <a:latin typeface="Bahnschrift" panose="020B0502040204020203" pitchFamily="34" charset="0"/>
-                <a:cs typeface="Aharoni" panose="02010803020104030203" pitchFamily="2" charset="-79"/>
+                <a:latin typeface="Bahnschrift"/>
+                <a:cs typeface="Aharoni"/>
               </a:rPr>
-              <a:t>Outils utilisés</a:t>
+              <a:t>Démonstration</a:t>
             </a:r>
           </a:p>
           <a:p>

</xml_diff>